<commit_message>
Edit pptx and code
</commit_message>
<xml_diff>
--- a/Tối ưu hóa.pptx
+++ b/Tối ưu hóa.pptx
@@ -10,8 +10,8 @@
     <p:sldId id="257" r:id="rId4"/>
     <p:sldId id="260" r:id="rId5"/>
     <p:sldId id="261" r:id="rId6"/>
-    <p:sldId id="262" r:id="rId7"/>
-    <p:sldId id="263" r:id="rId8"/>
+    <p:sldId id="263" r:id="rId7"/>
+    <p:sldId id="264" r:id="rId8"/>
   </p:sldIdLst>
   <p:sldSz cx="12192000" cy="6858000"/>
   <p:notesSz cx="6858000" cy="9144000"/>
@@ -6277,7 +6277,7 @@
           <p:cNvPr id="2" name="Title 1">
             <a:extLst>
               <a:ext uri="{FF2B5EF4-FFF2-40B4-BE49-F238E27FC236}">
-                <a16:creationId xmlns:a16="http://schemas.microsoft.com/office/drawing/2014/main" id="{27EF3494-E4C0-1D3B-E00B-651E2FB8FBFE}"/>
+                <a16:creationId xmlns:a16="http://schemas.microsoft.com/office/drawing/2014/main" id="{4E5070A9-CEB7-E71E-614E-BC9386BB20C0}"/>
               </a:ext>
             </a:extLst>
           </p:cNvPr>
@@ -6294,20 +6294,16 @@
           <a:lstStyle/>
           <a:p>
             <a:r>
+              <a:rPr lang="en-US" dirty="0" err="1"/>
+              <a:t>Thực</a:t>
+            </a:r>
+            <a:r>
               <a:rPr lang="en-US" dirty="0"/>
-              <a:t>Tập </a:t>
+              <a:t> </a:t>
             </a:r>
             <a:r>
               <a:rPr lang="en-US" dirty="0" err="1"/>
-              <a:t>dữ</a:t>
-            </a:r>
-            <a:r>
-              <a:rPr lang="en-US" dirty="0"/>
-              <a:t> </a:t>
-            </a:r>
-            <a:r>
-              <a:rPr lang="en-US" dirty="0" err="1"/>
-              <a:t>liệu</a:t>
+              <a:t>nghiệm</a:t>
             </a:r>
             <a:endParaRPr lang="en-US" dirty="0"/>
           </a:p>
@@ -6318,7 +6314,7 @@
           <p:cNvPr id="3" name="Content Placeholder 2">
             <a:extLst>
               <a:ext uri="{FF2B5EF4-FFF2-40B4-BE49-F238E27FC236}">
-                <a16:creationId xmlns:a16="http://schemas.microsoft.com/office/drawing/2014/main" id="{43B5A3BC-7B8E-0ED9-C33D-F06346E9EEF1}"/>
+                <a16:creationId xmlns:a16="http://schemas.microsoft.com/office/drawing/2014/main" id="{E4FC2552-A27A-D203-C6D6-5936C2C78DEA}"/>
               </a:ext>
             </a:extLst>
           </p:cNvPr>
@@ -6331,17 +6327,470 @@
         </p:nvSpPr>
         <p:spPr/>
         <p:txBody>
-          <a:bodyPr/>
+          <a:bodyPr>
+            <a:normAutofit/>
+          </a:bodyPr>
           <a:lstStyle/>
           <a:p>
-            <a:endParaRPr lang="en-US"/>
+            <a:r>
+              <a:rPr lang="en-US" sz="1800" dirty="0"/>
+              <a:t>I. Tập </a:t>
+            </a:r>
+            <a:r>
+              <a:rPr lang="en-US" sz="1800" dirty="0" err="1"/>
+              <a:t>dữ</a:t>
+            </a:r>
+            <a:r>
+              <a:rPr lang="en-US" sz="1800" dirty="0"/>
+              <a:t> </a:t>
+            </a:r>
+            <a:r>
+              <a:rPr lang="en-US" sz="1800" dirty="0" err="1"/>
+              <a:t>liệu</a:t>
+            </a:r>
+            <a:r>
+              <a:rPr lang="en-US" sz="1800" dirty="0"/>
+              <a:t>: </a:t>
+            </a:r>
+            <a:r>
+              <a:rPr lang="en-US" sz="1800" dirty="0" err="1"/>
+              <a:t>Gồm</a:t>
+            </a:r>
+            <a:r>
+              <a:rPr lang="en-US" sz="1800" dirty="0"/>
+              <a:t> </a:t>
+            </a:r>
+            <a:r>
+              <a:rPr lang="en-US" sz="1800" dirty="0" err="1"/>
+              <a:t>tọa</a:t>
+            </a:r>
+            <a:r>
+              <a:rPr lang="en-US" sz="1800" dirty="0"/>
+              <a:t> </a:t>
+            </a:r>
+            <a:r>
+              <a:rPr lang="en-US" sz="1800" dirty="0" err="1"/>
+              <a:t>độ</a:t>
+            </a:r>
+            <a:r>
+              <a:rPr lang="en-US" sz="1800" dirty="0"/>
+              <a:t> của 51 </a:t>
+            </a:r>
+            <a:r>
+              <a:rPr lang="en-US" sz="1800" dirty="0" err="1"/>
+              <a:t>thành</a:t>
+            </a:r>
+            <a:r>
+              <a:rPr lang="en-US" sz="1800" dirty="0"/>
+              <a:t> </a:t>
+            </a:r>
+            <a:r>
+              <a:rPr lang="en-US" sz="1800" dirty="0" err="1"/>
+              <a:t>phố</a:t>
+            </a:r>
+            <a:r>
+              <a:rPr lang="en-US" sz="1800" dirty="0"/>
+              <a:t> </a:t>
+            </a:r>
+            <a:r>
+              <a:rPr lang="en-US" sz="1800" dirty="0" err="1"/>
+              <a:t>khác</a:t>
+            </a:r>
+            <a:r>
+              <a:rPr lang="en-US" sz="1800" dirty="0"/>
+              <a:t> </a:t>
+            </a:r>
+            <a:r>
+              <a:rPr lang="en-US" sz="1800" dirty="0" err="1"/>
+              <a:t>nhau</a:t>
+            </a:r>
+            <a:r>
+              <a:rPr lang="en-US" sz="1800" dirty="0"/>
+              <a:t> </a:t>
+            </a:r>
+            <a:r>
+              <a:rPr lang="en-US" sz="1800" dirty="0" err="1"/>
+              <a:t>được</a:t>
+            </a:r>
+            <a:r>
+              <a:rPr lang="en-US" sz="1800" dirty="0"/>
+              <a:t> </a:t>
+            </a:r>
+            <a:r>
+              <a:rPr lang="en-US" sz="1800" dirty="0" err="1"/>
+              <a:t>tạo</a:t>
+            </a:r>
+            <a:r>
+              <a:rPr lang="en-US" sz="1800" dirty="0"/>
+              <a:t> </a:t>
+            </a:r>
+            <a:r>
+              <a:rPr lang="en-US" sz="1800" dirty="0" err="1"/>
+              <a:t>ngẫu</a:t>
+            </a:r>
+            <a:r>
+              <a:rPr lang="en-US" sz="1800" dirty="0"/>
+              <a:t> </a:t>
+            </a:r>
+            <a:r>
+              <a:rPr lang="en-US" sz="1800" dirty="0" err="1"/>
+              <a:t>nhiên</a:t>
+            </a:r>
+            <a:endParaRPr lang="en-US" sz="1800" dirty="0"/>
+          </a:p>
+          <a:p>
+            <a:r>
+              <a:rPr lang="en-US" sz="1800" dirty="0"/>
+              <a:t>I. </a:t>
+            </a:r>
+            <a:r>
+              <a:rPr lang="en-US" sz="1800" dirty="0" err="1"/>
+              <a:t>Các</a:t>
+            </a:r>
+            <a:r>
+              <a:rPr lang="en-US" sz="1800" dirty="0"/>
+              <a:t> </a:t>
+            </a:r>
+            <a:r>
+              <a:rPr lang="en-US" sz="1800" dirty="0" err="1"/>
+              <a:t>tham</a:t>
+            </a:r>
+            <a:r>
+              <a:rPr lang="en-US" sz="1800" dirty="0"/>
+              <a:t> số</a:t>
+            </a:r>
+          </a:p>
+          <a:p>
+            <a:r>
+              <a:rPr lang="en-US" sz="1800" dirty="0"/>
+              <a:t>  1. Số </a:t>
+            </a:r>
+            <a:r>
+              <a:rPr lang="en-US" sz="1800" dirty="0" err="1"/>
+              <a:t>lượng</a:t>
+            </a:r>
+            <a:r>
+              <a:rPr lang="en-US" sz="1800" dirty="0"/>
+              <a:t> </a:t>
+            </a:r>
+            <a:r>
+              <a:rPr lang="en-US" sz="1800" dirty="0" err="1"/>
+              <a:t>thế</a:t>
+            </a:r>
+            <a:r>
+              <a:rPr lang="en-US" sz="1800" dirty="0"/>
+              <a:t> </a:t>
+            </a:r>
+            <a:r>
+              <a:rPr lang="en-US" sz="1800" dirty="0" err="1"/>
+              <a:t>hệ</a:t>
+            </a:r>
+            <a:r>
+              <a:rPr lang="en-US" sz="1800" dirty="0"/>
+              <a:t>: 200</a:t>
+            </a:r>
+          </a:p>
+          <a:p>
+            <a:r>
+              <a:rPr lang="en-US" sz="1800" dirty="0"/>
+              <a:t>  2. Số </a:t>
+            </a:r>
+            <a:r>
+              <a:rPr lang="en-US" sz="1800" dirty="0" err="1"/>
+              <a:t>lượng</a:t>
+            </a:r>
+            <a:r>
+              <a:rPr lang="en-US" sz="1800" dirty="0"/>
+              <a:t> </a:t>
+            </a:r>
+            <a:r>
+              <a:rPr lang="en-US" sz="1800" dirty="0" err="1"/>
+              <a:t>cá</a:t>
+            </a:r>
+            <a:r>
+              <a:rPr lang="en-US" sz="1800" dirty="0"/>
+              <a:t> </a:t>
+            </a:r>
+            <a:r>
+              <a:rPr lang="en-US" sz="1800" dirty="0" err="1"/>
+              <a:t>thể</a:t>
+            </a:r>
+            <a:r>
+              <a:rPr lang="en-US" sz="1800" dirty="0"/>
+              <a:t> </a:t>
+            </a:r>
+            <a:r>
+              <a:rPr lang="en-US" sz="1800" dirty="0" err="1"/>
+              <a:t>trong</a:t>
+            </a:r>
+            <a:r>
+              <a:rPr lang="en-US" sz="1800" dirty="0"/>
+              <a:t> 1 </a:t>
+            </a:r>
+            <a:r>
+              <a:rPr lang="en-US" sz="1800" dirty="0" err="1"/>
+              <a:t>quần</a:t>
+            </a:r>
+            <a:r>
+              <a:rPr lang="en-US" sz="1800" dirty="0"/>
+              <a:t> </a:t>
+            </a:r>
+            <a:r>
+              <a:rPr lang="en-US" sz="1800" dirty="0" err="1"/>
+              <a:t>thể</a:t>
+            </a:r>
+            <a:r>
+              <a:rPr lang="en-US" sz="1800" dirty="0"/>
+              <a:t>: 2000</a:t>
+            </a:r>
+          </a:p>
+          <a:p>
+            <a:r>
+              <a:rPr lang="en-US" sz="1800" dirty="0"/>
+              <a:t>  3. </a:t>
+            </a:r>
+            <a:r>
+              <a:rPr lang="en-US" sz="1800" dirty="0" err="1"/>
+              <a:t>Tỷ</a:t>
+            </a:r>
+            <a:r>
+              <a:rPr lang="en-US" sz="1800" dirty="0"/>
+              <a:t> </a:t>
+            </a:r>
+            <a:r>
+              <a:rPr lang="en-US" sz="1800" dirty="0" err="1"/>
+              <a:t>lệ</a:t>
+            </a:r>
+            <a:r>
+              <a:rPr lang="en-US" sz="1800" dirty="0"/>
+              <a:t> </a:t>
+            </a:r>
+            <a:r>
+              <a:rPr lang="en-US" sz="1800" dirty="0" err="1"/>
+              <a:t>đột</a:t>
+            </a:r>
+            <a:r>
+              <a:rPr lang="en-US" sz="1800" dirty="0"/>
+              <a:t> </a:t>
+            </a:r>
+            <a:r>
+              <a:rPr lang="en-US" sz="1800" dirty="0" err="1"/>
+              <a:t>biến</a:t>
+            </a:r>
+            <a:r>
+              <a:rPr lang="en-US" sz="1800" dirty="0"/>
+              <a:t>: 0.1</a:t>
+            </a:r>
+          </a:p>
+          <a:p>
+            <a:r>
+              <a:rPr lang="en-US" sz="1800" dirty="0"/>
+              <a:t>  4. </a:t>
+            </a:r>
+            <a:r>
+              <a:rPr lang="en-US" sz="1800" dirty="0" err="1"/>
+              <a:t>Tỷ</a:t>
+            </a:r>
+            <a:r>
+              <a:rPr lang="en-US" sz="1800" dirty="0"/>
+              <a:t> </a:t>
+            </a:r>
+            <a:r>
+              <a:rPr lang="en-US" sz="1800" dirty="0" err="1"/>
+              <a:t>lệ</a:t>
+            </a:r>
+            <a:r>
+              <a:rPr lang="en-US" sz="1800" dirty="0"/>
+              <a:t> </a:t>
+            </a:r>
+            <a:r>
+              <a:rPr lang="en-US" sz="1800" dirty="0" err="1"/>
+              <a:t>lai</a:t>
+            </a:r>
+            <a:r>
+              <a:rPr lang="en-US" sz="1800" dirty="0"/>
+              <a:t> </a:t>
+            </a:r>
+            <a:r>
+              <a:rPr lang="en-US" sz="1800" dirty="0" err="1"/>
+              <a:t>ghép</a:t>
+            </a:r>
+            <a:r>
+              <a:rPr lang="en-US" sz="1800" dirty="0"/>
+              <a:t>: 0.9</a:t>
+            </a:r>
+          </a:p>
+          <a:p>
+            <a:r>
+              <a:rPr lang="en-US" sz="1800" dirty="0"/>
+              <a:t>II. </a:t>
+            </a:r>
+            <a:r>
+              <a:rPr lang="en-US" sz="1800" dirty="0" err="1"/>
+              <a:t>Kết</a:t>
+            </a:r>
+            <a:r>
+              <a:rPr lang="en-US" sz="1800" dirty="0"/>
+              <a:t> </a:t>
+            </a:r>
+            <a:r>
+              <a:rPr lang="en-US" sz="1800" dirty="0" err="1"/>
+              <a:t>quả</a:t>
+            </a:r>
+            <a:r>
+              <a:rPr lang="en-US" sz="1800" dirty="0"/>
+              <a:t> </a:t>
+            </a:r>
+            <a:r>
+              <a:rPr lang="en-US" sz="1800" dirty="0" err="1"/>
+              <a:t>thực</a:t>
+            </a:r>
+            <a:r>
+              <a:rPr lang="en-US" sz="1800" dirty="0"/>
+              <a:t> </a:t>
+            </a:r>
+            <a:r>
+              <a:rPr lang="en-US" sz="1800" dirty="0" err="1"/>
+              <a:t>nghiệm</a:t>
+            </a:r>
+            <a:endParaRPr lang="en-US" sz="1800" dirty="0"/>
+          </a:p>
+          <a:p>
+            <a:r>
+              <a:rPr lang="en-US" sz="1800" dirty="0"/>
+              <a:t>- </a:t>
+            </a:r>
+            <a:r>
+              <a:rPr lang="en-US" sz="1800" dirty="0" err="1"/>
+              <a:t>Kết</a:t>
+            </a:r>
+            <a:r>
+              <a:rPr lang="en-US" sz="1800" dirty="0"/>
+              <a:t> </a:t>
+            </a:r>
+            <a:r>
+              <a:rPr lang="en-US" sz="1800" dirty="0" err="1"/>
+              <a:t>quả</a:t>
+            </a:r>
+            <a:r>
+              <a:rPr lang="en-US" sz="1800" dirty="0"/>
+              <a:t> </a:t>
+            </a:r>
+            <a:r>
+              <a:rPr lang="en-US" sz="1800" dirty="0" err="1"/>
+              <a:t>sau</a:t>
+            </a:r>
+            <a:r>
+              <a:rPr lang="en-US" sz="1800" dirty="0"/>
+              <a:t> </a:t>
+            </a:r>
+            <a:r>
+              <a:rPr lang="en-US" sz="1800" dirty="0" err="1"/>
+              <a:t>một</a:t>
+            </a:r>
+            <a:r>
+              <a:rPr lang="en-US" sz="1800" dirty="0"/>
+              <a:t> </a:t>
+            </a:r>
+            <a:r>
+              <a:rPr lang="en-US" sz="1800" dirty="0" err="1"/>
+              <a:t>thế</a:t>
+            </a:r>
+            <a:r>
+              <a:rPr lang="en-US" sz="1800" dirty="0"/>
+              <a:t> </a:t>
+            </a:r>
+            <a:r>
+              <a:rPr lang="en-US" sz="1800" dirty="0" err="1"/>
+              <a:t>hệ</a:t>
+            </a:r>
+            <a:r>
+              <a:rPr lang="en-US" sz="1800" dirty="0"/>
+              <a:t>: 1363.66</a:t>
+            </a:r>
+          </a:p>
+          <a:p>
+            <a:r>
+              <a:rPr lang="en-US" sz="1800" dirty="0"/>
+              <a:t>- </a:t>
+            </a:r>
+            <a:r>
+              <a:rPr lang="en-US" sz="1800" dirty="0" err="1"/>
+              <a:t>Kết</a:t>
+            </a:r>
+            <a:r>
+              <a:rPr lang="en-US" sz="1800" dirty="0"/>
+              <a:t> </a:t>
+            </a:r>
+            <a:r>
+              <a:rPr lang="en-US" sz="1800" dirty="0" err="1"/>
+              <a:t>quả</a:t>
+            </a:r>
+            <a:r>
+              <a:rPr lang="en-US" sz="1800" dirty="0"/>
+              <a:t> </a:t>
+            </a:r>
+            <a:r>
+              <a:rPr lang="en-US" sz="1800" dirty="0" err="1"/>
+              <a:t>sau</a:t>
+            </a:r>
+            <a:r>
+              <a:rPr lang="en-US" sz="1800" dirty="0"/>
+              <a:t> 200 </a:t>
+            </a:r>
+            <a:r>
+              <a:rPr lang="en-US" sz="1800" dirty="0" err="1"/>
+              <a:t>thế</a:t>
+            </a:r>
+            <a:r>
+              <a:rPr lang="en-US" sz="1800" dirty="0"/>
+              <a:t> </a:t>
+            </a:r>
+            <a:r>
+              <a:rPr lang="en-US" sz="1800" dirty="0" err="1"/>
+              <a:t>hệ</a:t>
+            </a:r>
+            <a:r>
+              <a:rPr lang="en-US" sz="1800" dirty="0"/>
+              <a:t>: 499.62</a:t>
+            </a:r>
           </a:p>
         </p:txBody>
       </p:sp>
+      <p:pic>
+        <p:nvPicPr>
+          <p:cNvPr id="5" name="Picture 4">
+            <a:extLst>
+              <a:ext uri="{FF2B5EF4-FFF2-40B4-BE49-F238E27FC236}">
+                <a16:creationId xmlns:a16="http://schemas.microsoft.com/office/drawing/2014/main" id="{0F969EF4-86DA-2C81-DB65-BE3D760F9640}"/>
+              </a:ext>
+            </a:extLst>
+          </p:cNvPr>
+          <p:cNvPicPr>
+            <a:picLocks noChangeAspect="1"/>
+          </p:cNvPicPr>
+          <p:nvPr/>
+        </p:nvPicPr>
+        <p:blipFill>
+          <a:blip r:embed="rId2"/>
+          <a:stretch>
+            <a:fillRect/>
+          </a:stretch>
+        </p:blipFill>
+        <p:spPr>
+          <a:xfrm>
+            <a:off x="6366454" y="2233146"/>
+            <a:ext cx="4728266" cy="4045295"/>
+          </a:xfrm>
+          <a:prstGeom prst="rect">
+            <a:avLst/>
+          </a:prstGeom>
+        </p:spPr>
+      </p:pic>
     </p:spTree>
     <p:extLst>
       <p:ext uri="{BB962C8B-B14F-4D97-AF65-F5344CB8AC3E}">
-        <p14:creationId xmlns:p14="http://schemas.microsoft.com/office/powerpoint/2010/main" val="2347243163"/>
+        <p14:creationId xmlns:p14="http://schemas.microsoft.com/office/powerpoint/2010/main" val="2478447095"/>
       </p:ext>
     </p:extLst>
   </p:cSld>
@@ -6391,7 +6840,7 @@
           <a:p>
             <a:r>
               <a:rPr lang="en-US" dirty="0" err="1"/>
-              <a:t>Các</a:t>
+              <a:t>Đánh</a:t>
             </a:r>
             <a:r>
               <a:rPr lang="en-US" dirty="0"/>
@@ -6399,12 +6848,33 @@
             </a:r>
             <a:r>
               <a:rPr lang="en-US" dirty="0" err="1"/>
-              <a:t>tham</a:t>
+              <a:t>giá</a:t>
             </a:r>
             <a:r>
               <a:rPr lang="en-US" dirty="0"/>
-              <a:t> số</a:t>
-            </a:r>
+              <a:t> </a:t>
+            </a:r>
+            <a:r>
+              <a:rPr lang="en-US" dirty="0" err="1"/>
+              <a:t>và</a:t>
+            </a:r>
+            <a:r>
+              <a:rPr lang="en-US" dirty="0"/>
+              <a:t> </a:t>
+            </a:r>
+            <a:r>
+              <a:rPr lang="en-US" dirty="0" err="1"/>
+              <a:t>kết</a:t>
+            </a:r>
+            <a:r>
+              <a:rPr lang="en-US" dirty="0"/>
+              <a:t> </a:t>
+            </a:r>
+            <a:r>
+              <a:rPr lang="en-US" dirty="0" err="1"/>
+              <a:t>luận</a:t>
+            </a:r>
+            <a:endParaRPr lang="en-US" dirty="0"/>
           </a:p>
         </p:txBody>
       </p:sp>
@@ -6426,174 +6896,718 @@
         </p:nvSpPr>
         <p:spPr/>
         <p:txBody>
-          <a:bodyPr/>
+          <a:bodyPr>
+            <a:normAutofit/>
+          </a:bodyPr>
           <a:lstStyle/>
           <a:p>
             <a:r>
-              <a:rPr lang="en-US" dirty="0"/>
-              <a:t>1. Số </a:t>
-            </a:r>
-            <a:r>
-              <a:rPr lang="en-US" dirty="0" err="1"/>
-              <a:t>lượng</a:t>
-            </a:r>
-            <a:r>
-              <a:rPr lang="en-US" dirty="0"/>
-              <a:t> </a:t>
-            </a:r>
-            <a:r>
-              <a:rPr lang="en-US" dirty="0" err="1"/>
-              <a:t>thế</a:t>
-            </a:r>
-            <a:r>
-              <a:rPr lang="en-US" dirty="0"/>
-              <a:t> </a:t>
-            </a:r>
-            <a:r>
-              <a:rPr lang="en-US" dirty="0" err="1"/>
-              <a:t>hệ</a:t>
-            </a:r>
-            <a:r>
-              <a:rPr lang="en-US" dirty="0"/>
-              <a:t>: 100</a:t>
-            </a:r>
-          </a:p>
-          <a:p>
-            <a:r>
-              <a:rPr lang="en-US" dirty="0"/>
-              <a:t>2. Số </a:t>
-            </a:r>
-            <a:r>
-              <a:rPr lang="en-US" dirty="0" err="1"/>
-              <a:t>lượng</a:t>
-            </a:r>
-            <a:r>
-              <a:rPr lang="en-US" dirty="0"/>
-              <a:t> </a:t>
-            </a:r>
-            <a:r>
-              <a:rPr lang="en-US" dirty="0" err="1"/>
+              <a:rPr lang="en-US" sz="1800" dirty="0"/>
+              <a:t>1. </a:t>
+            </a:r>
+            <a:r>
+              <a:rPr lang="en-US" sz="1800" dirty="0" err="1"/>
+              <a:t>Độ</a:t>
+            </a:r>
+            <a:r>
+              <a:rPr lang="en-US" sz="1800" dirty="0"/>
+              <a:t> </a:t>
+            </a:r>
+            <a:r>
+              <a:rPr lang="en-US" sz="1800" dirty="0" err="1"/>
+              <a:t>phức</a:t>
+            </a:r>
+            <a:r>
+              <a:rPr lang="en-US" sz="1800" dirty="0"/>
+              <a:t> </a:t>
+            </a:r>
+            <a:r>
+              <a:rPr lang="en-US" sz="1800" dirty="0" err="1"/>
+              <a:t>tạp</a:t>
+            </a:r>
+            <a:endParaRPr lang="en-US" sz="1800" dirty="0"/>
+          </a:p>
+          <a:p>
+            <a:r>
+              <a:rPr lang="en-US" sz="1800" dirty="0"/>
+              <a:t>- Time complexity: O(n</a:t>
+            </a:r>
+            <a:r>
+              <a:rPr lang="en-US" sz="1800" baseline="30000" dirty="0"/>
+              <a:t>2</a:t>
+            </a:r>
+            <a:r>
+              <a:rPr lang="en-US" sz="1800" dirty="0"/>
+              <a:t>)</a:t>
+            </a:r>
+          </a:p>
+          <a:p>
+            <a:r>
+              <a:rPr lang="en-US" sz="1800" dirty="0"/>
+              <a:t>- Space complexity: O(n)</a:t>
+            </a:r>
+          </a:p>
+          <a:p>
+            <a:r>
+              <a:rPr lang="en-US" sz="1800" dirty="0"/>
+              <a:t>2. </a:t>
+            </a:r>
+            <a:r>
+              <a:rPr lang="en-US" sz="1800" dirty="0" err="1"/>
+              <a:t>Kết</a:t>
+            </a:r>
+            <a:r>
+              <a:rPr lang="en-US" sz="1800" dirty="0"/>
+              <a:t> </a:t>
+            </a:r>
+            <a:r>
+              <a:rPr lang="en-US" sz="1800" dirty="0" err="1"/>
+              <a:t>luận</a:t>
+            </a:r>
+            <a:r>
+              <a:rPr lang="en-US" sz="1800" dirty="0"/>
+              <a:t>: </a:t>
+            </a:r>
+            <a:r>
+              <a:rPr lang="en-US" sz="1800" dirty="0" err="1"/>
+              <a:t>Thuật</a:t>
+            </a:r>
+            <a:r>
+              <a:rPr lang="en-US" sz="1800" dirty="0"/>
+              <a:t> </a:t>
+            </a:r>
+            <a:r>
+              <a:rPr lang="en-US" sz="1800" dirty="0" err="1"/>
+              <a:t>toán</a:t>
+            </a:r>
+            <a:r>
+              <a:rPr lang="en-US" sz="1800" dirty="0"/>
+              <a:t> di </a:t>
+            </a:r>
+            <a:r>
+              <a:rPr lang="en-US" sz="1800" dirty="0" err="1"/>
+              <a:t>truyền</a:t>
+            </a:r>
+            <a:r>
+              <a:rPr lang="en-US" sz="1800" dirty="0"/>
+              <a:t> có </a:t>
+            </a:r>
+            <a:r>
+              <a:rPr lang="en-US" sz="1800" dirty="0" err="1"/>
+              <a:t>thể</a:t>
+            </a:r>
+            <a:r>
+              <a:rPr lang="en-US" sz="1800" dirty="0"/>
+              <a:t> </a:t>
+            </a:r>
+            <a:r>
+              <a:rPr lang="en-US" sz="1800" dirty="0" err="1"/>
+              <a:t>sử</a:t>
+            </a:r>
+            <a:r>
+              <a:rPr lang="en-US" sz="1800" dirty="0"/>
+              <a:t> </a:t>
+            </a:r>
+            <a:r>
+              <a:rPr lang="en-US" sz="1800" dirty="0" err="1"/>
+              <a:t>dụng</a:t>
+            </a:r>
+            <a:r>
+              <a:rPr lang="en-US" sz="1800" dirty="0"/>
+              <a:t> </a:t>
+            </a:r>
+            <a:r>
+              <a:rPr lang="en-US" sz="1800" dirty="0" err="1"/>
+              <a:t>để</a:t>
+            </a:r>
+            <a:r>
+              <a:rPr lang="en-US" sz="1800" dirty="0"/>
+              <a:t> giải bài </a:t>
+            </a:r>
+            <a:r>
+              <a:rPr lang="en-US" sz="1800" dirty="0" err="1"/>
+              <a:t>toán</a:t>
+            </a:r>
+            <a:r>
+              <a:rPr lang="en-US" sz="1800" dirty="0"/>
+              <a:t> TSP </a:t>
+            </a:r>
+            <a:r>
+              <a:rPr lang="en-US" sz="1800" dirty="0" err="1"/>
+              <a:t>cùng</a:t>
+            </a:r>
+            <a:r>
+              <a:rPr lang="en-US" sz="1800" dirty="0"/>
+              <a:t> </a:t>
+            </a:r>
+            <a:r>
+              <a:rPr lang="en-US" sz="1800" dirty="0" err="1"/>
+              <a:t>với</a:t>
+            </a:r>
+            <a:r>
+              <a:rPr lang="en-US" sz="1800" dirty="0"/>
+              <a:t> </a:t>
+            </a:r>
+            <a:r>
+              <a:rPr lang="en-US" sz="1800" dirty="0" err="1"/>
+              <a:t>nhiều</a:t>
+            </a:r>
+            <a:r>
+              <a:rPr lang="en-US" sz="1800" dirty="0"/>
+              <a:t> bài </a:t>
+            </a:r>
+            <a:r>
+              <a:rPr lang="en-US" sz="1800" dirty="0" err="1"/>
+              <a:t>toán</a:t>
+            </a:r>
+            <a:r>
+              <a:rPr lang="en-US" sz="1800" dirty="0"/>
+              <a:t> </a:t>
+            </a:r>
+            <a:r>
+              <a:rPr lang="en-US" sz="1800" dirty="0" err="1"/>
+              <a:t>tối</a:t>
+            </a:r>
+            <a:r>
+              <a:rPr lang="en-US" sz="1800" dirty="0"/>
+              <a:t> </a:t>
+            </a:r>
+            <a:r>
+              <a:rPr lang="en-US" sz="1800" dirty="0" err="1"/>
+              <a:t>ưu</a:t>
+            </a:r>
+            <a:r>
+              <a:rPr lang="en-US" sz="1800" dirty="0"/>
+              <a:t> </a:t>
+            </a:r>
+            <a:r>
+              <a:rPr lang="en-US" sz="1800" dirty="0" err="1"/>
+              <a:t>tổ</a:t>
+            </a:r>
+            <a:r>
+              <a:rPr lang="en-US" sz="1800" dirty="0"/>
+              <a:t> </a:t>
+            </a:r>
+            <a:r>
+              <a:rPr lang="en-US" sz="1800" dirty="0" err="1"/>
+              <a:t>hợp</a:t>
+            </a:r>
+            <a:r>
+              <a:rPr lang="en-US" sz="1800" dirty="0"/>
+              <a:t> </a:t>
+            </a:r>
+            <a:r>
+              <a:rPr lang="en-US" sz="1800" dirty="0" err="1"/>
+              <a:t>khác</a:t>
+            </a:r>
+            <a:r>
+              <a:rPr lang="en-US" sz="1800" dirty="0"/>
+              <a:t>. </a:t>
+            </a:r>
+            <a:r>
+              <a:rPr lang="en-US" sz="1800" dirty="0" err="1"/>
+              <a:t>Thuật</a:t>
+            </a:r>
+            <a:r>
+              <a:rPr lang="en-US" sz="1800" dirty="0"/>
+              <a:t> </a:t>
+            </a:r>
+            <a:r>
+              <a:rPr lang="en-US" sz="1800" dirty="0" err="1"/>
+              <a:t>toán</a:t>
+            </a:r>
+            <a:r>
+              <a:rPr lang="en-US" sz="1800" dirty="0"/>
+              <a:t> di </a:t>
+            </a:r>
+            <a:r>
+              <a:rPr lang="en-US" sz="1800" dirty="0" err="1"/>
+              <a:t>truyền</a:t>
+            </a:r>
+            <a:r>
+              <a:rPr lang="en-US" sz="1800" dirty="0"/>
+              <a:t> </a:t>
+            </a:r>
+            <a:r>
+              <a:rPr lang="en-US" sz="1800" dirty="0" err="1"/>
+              <a:t>lặp</a:t>
+            </a:r>
+            <a:r>
+              <a:rPr lang="en-US" sz="1800" dirty="0"/>
+              <a:t> đi </a:t>
+            </a:r>
+            <a:r>
+              <a:rPr lang="en-US" sz="1800" dirty="0" err="1"/>
+              <a:t>lặp</a:t>
+            </a:r>
+            <a:r>
+              <a:rPr lang="en-US" sz="1800" dirty="0"/>
+              <a:t> </a:t>
+            </a:r>
+            <a:r>
+              <a:rPr lang="en-US" sz="1800" dirty="0" err="1"/>
+              <a:t>lại</a:t>
+            </a:r>
+            <a:r>
+              <a:rPr lang="en-US" sz="1800" dirty="0"/>
+              <a:t> </a:t>
+            </a:r>
+            <a:r>
+              <a:rPr lang="en-US" sz="1800" dirty="0" err="1"/>
+              <a:t>việc</a:t>
+            </a:r>
+            <a:r>
+              <a:rPr lang="en-US" sz="1800" dirty="0"/>
+              <a:t> tìm </a:t>
+            </a:r>
+            <a:r>
+              <a:rPr lang="en-US" sz="1800" dirty="0" err="1"/>
+              <a:t>kiếm</a:t>
+            </a:r>
+            <a:r>
+              <a:rPr lang="en-US" sz="1800" dirty="0"/>
+              <a:t> </a:t>
+            </a:r>
+            <a:r>
+              <a:rPr lang="en-US" sz="1800" dirty="0" err="1"/>
+              <a:t>không</a:t>
+            </a:r>
+            <a:r>
+              <a:rPr lang="en-US" sz="1800" dirty="0"/>
+              <a:t> </a:t>
+            </a:r>
+            <a:r>
+              <a:rPr lang="en-US" sz="1800" dirty="0" err="1"/>
+              <a:t>gian</a:t>
+            </a:r>
+            <a:r>
+              <a:rPr lang="en-US" sz="1800" dirty="0"/>
+              <a:t> </a:t>
+            </a:r>
+            <a:r>
+              <a:rPr lang="en-US" sz="1800" dirty="0" err="1"/>
+              <a:t>lời</a:t>
+            </a:r>
+            <a:r>
+              <a:rPr lang="en-US" sz="1800" dirty="0"/>
+              <a:t> giải </a:t>
+            </a:r>
+            <a:r>
+              <a:rPr lang="en-US" sz="1800" dirty="0" err="1"/>
+              <a:t>khả</a:t>
+            </a:r>
+            <a:r>
+              <a:rPr lang="en-US" sz="1800" dirty="0"/>
+              <a:t> </a:t>
+            </a:r>
+            <a:r>
+              <a:rPr lang="en-US" sz="1800" dirty="0" err="1"/>
+              <a:t>thi</a:t>
+            </a:r>
+            <a:r>
+              <a:rPr lang="en-US" sz="1800" dirty="0"/>
+              <a:t> (</a:t>
+            </a:r>
+            <a:r>
+              <a:rPr lang="en-US" sz="1800" dirty="0" err="1"/>
+              <a:t>quần</a:t>
+            </a:r>
+            <a:r>
+              <a:rPr lang="en-US" sz="1800" dirty="0"/>
+              <a:t> </a:t>
+            </a:r>
+            <a:r>
+              <a:rPr lang="en-US" sz="1800" dirty="0" err="1"/>
+              <a:t>thể</a:t>
+            </a:r>
+            <a:r>
+              <a:rPr lang="en-US" sz="1800" dirty="0"/>
+              <a:t>), </a:t>
+            </a:r>
+            <a:r>
+              <a:rPr lang="en-US" sz="1800" dirty="0" err="1"/>
+              <a:t>cải</a:t>
+            </a:r>
+            <a:r>
+              <a:rPr lang="en-US" sz="1800" dirty="0"/>
+              <a:t> </a:t>
+            </a:r>
+            <a:r>
+              <a:rPr lang="en-US" sz="1800" dirty="0" err="1"/>
+              <a:t>thiện</a:t>
+            </a:r>
+            <a:r>
+              <a:rPr lang="en-US" sz="1800" dirty="0"/>
+              <a:t> </a:t>
+            </a:r>
+            <a:r>
+              <a:rPr lang="en-US" sz="1800" dirty="0" err="1"/>
+              <a:t>độ</a:t>
+            </a:r>
+            <a:r>
+              <a:rPr lang="en-US" sz="1800" dirty="0"/>
+              <a:t> </a:t>
+            </a:r>
+            <a:r>
+              <a:rPr lang="en-US" sz="1800" dirty="0" err="1"/>
+              <a:t>dài</a:t>
+            </a:r>
+            <a:r>
+              <a:rPr lang="en-US" sz="1800" dirty="0"/>
+              <a:t> </a:t>
+            </a:r>
+            <a:r>
+              <a:rPr lang="en-US" sz="1800" dirty="0" err="1"/>
+              <a:t>đường</a:t>
+            </a:r>
+            <a:r>
+              <a:rPr lang="en-US" sz="1800" dirty="0"/>
+              <a:t> đi (</a:t>
+            </a:r>
+            <a:r>
+              <a:rPr lang="en-US" sz="1800" dirty="0" err="1"/>
               <a:t>cá</a:t>
             </a:r>
             <a:r>
-              <a:rPr lang="en-US" dirty="0"/>
-              <a:t> </a:t>
-            </a:r>
-            <a:r>
-              <a:rPr lang="en-US" dirty="0" err="1"/>
+              <a:rPr lang="en-US" sz="1800" dirty="0"/>
+              <a:t> </a:t>
+            </a:r>
+            <a:r>
+              <a:rPr lang="en-US" sz="1800" dirty="0" err="1"/>
               <a:t>thể</a:t>
             </a:r>
             <a:r>
-              <a:rPr lang="en-US" dirty="0"/>
-              <a:t> </a:t>
-            </a:r>
-            <a:r>
-              <a:rPr lang="en-US" dirty="0" err="1"/>
-              <a:t>trong</a:t>
-            </a:r>
-            <a:r>
-              <a:rPr lang="en-US" dirty="0"/>
-              <a:t> 1 </a:t>
-            </a:r>
-            <a:r>
-              <a:rPr lang="en-US" dirty="0" err="1"/>
+              <a:rPr lang="en-US" sz="1800" dirty="0"/>
+              <a:t>) </a:t>
+            </a:r>
+            <a:r>
+              <a:rPr lang="en-US" sz="1800" dirty="0" err="1"/>
+              <a:t>để</a:t>
+            </a:r>
+            <a:r>
+              <a:rPr lang="en-US" sz="1800" dirty="0"/>
+              <a:t> </a:t>
+            </a:r>
+            <a:r>
+              <a:rPr lang="en-US" sz="1800" dirty="0" err="1"/>
+              <a:t>đạt</a:t>
+            </a:r>
+            <a:r>
+              <a:rPr lang="en-US" sz="1800" dirty="0"/>
+              <a:t> </a:t>
+            </a:r>
+            <a:r>
+              <a:rPr lang="en-US" sz="1800" dirty="0" err="1"/>
+              <a:t>được</a:t>
+            </a:r>
+            <a:r>
+              <a:rPr lang="en-US" sz="1800" dirty="0"/>
+              <a:t> </a:t>
+            </a:r>
+            <a:r>
+              <a:rPr lang="en-US" sz="1800" dirty="0" err="1"/>
+              <a:t>lời</a:t>
+            </a:r>
+            <a:r>
+              <a:rPr lang="en-US" sz="1800" dirty="0"/>
+              <a:t> giải </a:t>
+            </a:r>
+            <a:r>
+              <a:rPr lang="en-US" sz="1800" dirty="0" err="1"/>
+              <a:t>tốt</a:t>
+            </a:r>
+            <a:r>
+              <a:rPr lang="en-US" sz="1800" dirty="0"/>
+              <a:t> </a:t>
+            </a:r>
+            <a:r>
+              <a:rPr lang="en-US" sz="1800" dirty="0" err="1"/>
+              <a:t>hơn</a:t>
+            </a:r>
+            <a:r>
+              <a:rPr lang="en-US" sz="1800" dirty="0"/>
+              <a:t> </a:t>
+            </a:r>
+            <a:r>
+              <a:rPr lang="en-US" sz="1800" dirty="0" err="1"/>
+              <a:t>thông</a:t>
+            </a:r>
+            <a:r>
+              <a:rPr lang="en-US" sz="1800" dirty="0"/>
+              <a:t> qua </a:t>
+            </a:r>
+            <a:r>
+              <a:rPr lang="en-US" sz="1800" dirty="0" err="1"/>
+              <a:t>lý</a:t>
+            </a:r>
+            <a:r>
+              <a:rPr lang="en-US" sz="1800" dirty="0"/>
+              <a:t> </a:t>
+            </a:r>
+            <a:r>
+              <a:rPr lang="en-US" sz="1800" dirty="0" err="1"/>
+              <a:t>thuyết</a:t>
+            </a:r>
+            <a:r>
+              <a:rPr lang="en-US" sz="1800" dirty="0"/>
+              <a:t> </a:t>
+            </a:r>
+            <a:r>
+              <a:rPr lang="en-US" sz="1800" dirty="0" err="1"/>
+              <a:t>về</a:t>
+            </a:r>
+            <a:r>
+              <a:rPr lang="en-US" sz="1800" dirty="0"/>
+              <a:t> di </a:t>
+            </a:r>
+            <a:r>
+              <a:rPr lang="en-US" sz="1800" dirty="0" err="1"/>
+              <a:t>truyền</a:t>
+            </a:r>
+            <a:r>
+              <a:rPr lang="en-US" sz="1800" dirty="0"/>
+              <a:t> </a:t>
+            </a:r>
+            <a:r>
+              <a:rPr lang="en-US" sz="1800" dirty="0" err="1"/>
+              <a:t>và</a:t>
+            </a:r>
+            <a:r>
+              <a:rPr lang="en-US" sz="1800" dirty="0"/>
+              <a:t> </a:t>
+            </a:r>
+            <a:r>
+              <a:rPr lang="en-US" sz="1800" dirty="0" err="1"/>
+              <a:t>tiến</a:t>
+            </a:r>
+            <a:r>
+              <a:rPr lang="en-US" sz="1800" dirty="0"/>
+              <a:t> </a:t>
+            </a:r>
+            <a:r>
+              <a:rPr lang="en-US" sz="1800" dirty="0" err="1"/>
+              <a:t>hóa</a:t>
+            </a:r>
+            <a:r>
+              <a:rPr lang="en-US" sz="1800" dirty="0"/>
+              <a:t>. </a:t>
+            </a:r>
+            <a:r>
+              <a:rPr lang="en-US" sz="1800" dirty="0" err="1"/>
+              <a:t>Thuật</a:t>
+            </a:r>
+            <a:r>
+              <a:rPr lang="en-US" sz="1800" dirty="0"/>
+              <a:t> </a:t>
+            </a:r>
+            <a:r>
+              <a:rPr lang="en-US" sz="1800" dirty="0" err="1"/>
+              <a:t>toán</a:t>
+            </a:r>
+            <a:r>
+              <a:rPr lang="en-US" sz="1800" dirty="0"/>
+              <a:t> di </a:t>
+            </a:r>
+            <a:r>
+              <a:rPr lang="en-US" sz="1800" dirty="0" err="1"/>
+              <a:t>truyền</a:t>
+            </a:r>
+            <a:r>
+              <a:rPr lang="en-US" sz="1800" dirty="0"/>
+              <a:t> </a:t>
+            </a:r>
+            <a:r>
+              <a:rPr lang="en-US" sz="1800" dirty="0" err="1"/>
+              <a:t>đưa</a:t>
+            </a:r>
+            <a:r>
+              <a:rPr lang="en-US" sz="1800" dirty="0"/>
+              <a:t> </a:t>
+            </a:r>
+            <a:r>
+              <a:rPr lang="en-US" sz="1800" dirty="0" err="1"/>
+              <a:t>ra</a:t>
+            </a:r>
+            <a:r>
+              <a:rPr lang="en-US" sz="1800" dirty="0"/>
+              <a:t> </a:t>
+            </a:r>
+            <a:r>
+              <a:rPr lang="en-US" sz="1800" dirty="0" err="1"/>
+              <a:t>các</a:t>
+            </a:r>
+            <a:r>
+              <a:rPr lang="en-US" sz="1800" dirty="0"/>
+              <a:t> </a:t>
+            </a:r>
+            <a:r>
+              <a:rPr lang="en-US" sz="1800" dirty="0" err="1"/>
+              <a:t>cá</a:t>
+            </a:r>
+            <a:r>
+              <a:rPr lang="en-US" sz="1800" dirty="0"/>
+              <a:t> </a:t>
+            </a:r>
+            <a:r>
+              <a:rPr lang="en-US" sz="1800" dirty="0" err="1"/>
+              <a:t>thể</a:t>
+            </a:r>
+            <a:r>
+              <a:rPr lang="en-US" sz="1800" dirty="0"/>
+              <a:t> </a:t>
+            </a:r>
+            <a:r>
+              <a:rPr lang="en-US" sz="1800" dirty="0" err="1"/>
+              <a:t>tốt</a:t>
+            </a:r>
+            <a:r>
+              <a:rPr lang="en-US" sz="1800" dirty="0"/>
+              <a:t> </a:t>
+            </a:r>
+            <a:r>
+              <a:rPr lang="en-US" sz="1800" dirty="0" err="1"/>
+              <a:t>hơn</a:t>
+            </a:r>
+            <a:r>
+              <a:rPr lang="en-US" sz="1800" dirty="0"/>
+              <a:t> </a:t>
+            </a:r>
+            <a:r>
+              <a:rPr lang="en-US" sz="1800" dirty="0" err="1"/>
+              <a:t>và</a:t>
+            </a:r>
+            <a:r>
+              <a:rPr lang="en-US" sz="1800" dirty="0"/>
+              <a:t> </a:t>
+            </a:r>
+            <a:r>
+              <a:rPr lang="en-US" sz="1800" dirty="0" err="1"/>
+              <a:t>bảo</a:t>
+            </a:r>
+            <a:r>
+              <a:rPr lang="en-US" sz="1800" dirty="0"/>
+              <a:t> </a:t>
+            </a:r>
+            <a:r>
+              <a:rPr lang="en-US" sz="1800" dirty="0" err="1"/>
+              <a:t>tồn</a:t>
+            </a:r>
+            <a:r>
+              <a:rPr lang="en-US" sz="1800" dirty="0"/>
+              <a:t> </a:t>
+            </a:r>
+            <a:r>
+              <a:rPr lang="en-US" sz="1800" dirty="0" err="1"/>
+              <a:t>sự</a:t>
+            </a:r>
+            <a:r>
+              <a:rPr lang="en-US" sz="1800" dirty="0"/>
+              <a:t> </a:t>
+            </a:r>
+            <a:r>
+              <a:rPr lang="en-US" sz="1800" dirty="0" err="1"/>
+              <a:t>đa</a:t>
+            </a:r>
+            <a:r>
+              <a:rPr lang="en-US" sz="1800" dirty="0"/>
+              <a:t> </a:t>
+            </a:r>
+            <a:r>
+              <a:rPr lang="en-US" sz="1800" dirty="0" err="1"/>
+              <a:t>dạng</a:t>
+            </a:r>
+            <a:r>
+              <a:rPr lang="en-US" sz="1800" dirty="0"/>
+              <a:t> của </a:t>
+            </a:r>
+            <a:r>
+              <a:rPr lang="en-US" sz="1800" dirty="0" err="1"/>
               <a:t>quần</a:t>
             </a:r>
             <a:r>
-              <a:rPr lang="en-US" dirty="0"/>
-              <a:t> </a:t>
-            </a:r>
-            <a:r>
-              <a:rPr lang="en-US" dirty="0" err="1"/>
+              <a:rPr lang="en-US" sz="1800" dirty="0"/>
+              <a:t> </a:t>
+            </a:r>
+            <a:r>
+              <a:rPr lang="en-US" sz="1800" dirty="0" err="1"/>
               <a:t>thể</a:t>
             </a:r>
             <a:r>
-              <a:rPr lang="en-US" dirty="0"/>
-              <a:t>: 2000</a:t>
-            </a:r>
-          </a:p>
-          <a:p>
-            <a:r>
-              <a:rPr lang="en-US" dirty="0"/>
-              <a:t>3. </a:t>
-            </a:r>
-            <a:r>
-              <a:rPr lang="en-US" dirty="0" err="1"/>
-              <a:t>Tỷ</a:t>
-            </a:r>
-            <a:r>
-              <a:rPr lang="en-US" dirty="0"/>
-              <a:t> </a:t>
-            </a:r>
-            <a:r>
-              <a:rPr lang="en-US" dirty="0" err="1"/>
-              <a:t>lệ</a:t>
-            </a:r>
-            <a:r>
-              <a:rPr lang="en-US" dirty="0"/>
-              <a:t> </a:t>
-            </a:r>
-            <a:r>
-              <a:rPr lang="en-US" dirty="0" err="1"/>
+              <a:rPr lang="en-US" sz="1800" dirty="0"/>
+              <a:t> </a:t>
+            </a:r>
+            <a:r>
+              <a:rPr lang="en-US" sz="1800" dirty="0" err="1"/>
+              <a:t>thông</a:t>
+            </a:r>
+            <a:r>
+              <a:rPr lang="en-US" sz="1800" dirty="0"/>
+              <a:t> qua </a:t>
+            </a:r>
+            <a:r>
+              <a:rPr lang="en-US" sz="1800" dirty="0" err="1"/>
+              <a:t>chọn</a:t>
+            </a:r>
+            <a:r>
+              <a:rPr lang="en-US" sz="1800" dirty="0"/>
+              <a:t> </a:t>
+            </a:r>
+            <a:r>
+              <a:rPr lang="en-US" sz="1800" dirty="0" err="1"/>
+              <a:t>lọc</a:t>
+            </a:r>
+            <a:r>
+              <a:rPr lang="en-US" sz="1800" dirty="0"/>
+              <a:t>, </a:t>
+            </a:r>
+            <a:r>
+              <a:rPr lang="en-US" sz="1800" dirty="0" err="1"/>
+              <a:t>lai</a:t>
+            </a:r>
+            <a:r>
+              <a:rPr lang="en-US" sz="1800" dirty="0"/>
+              <a:t> </a:t>
+            </a:r>
+            <a:r>
+              <a:rPr lang="en-US" sz="1800" dirty="0" err="1"/>
+              <a:t>ghép</a:t>
+            </a:r>
+            <a:r>
+              <a:rPr lang="en-US" sz="1800" dirty="0"/>
+              <a:t> </a:t>
+            </a:r>
+            <a:r>
+              <a:rPr lang="en-US" sz="1800" dirty="0" err="1"/>
+              <a:t>và</a:t>
+            </a:r>
+            <a:r>
+              <a:rPr lang="en-US" sz="1800" dirty="0"/>
+              <a:t> </a:t>
+            </a:r>
+            <a:r>
+              <a:rPr lang="en-US" sz="1800" dirty="0" err="1"/>
               <a:t>đột</a:t>
             </a:r>
             <a:r>
-              <a:rPr lang="en-US" dirty="0"/>
-              <a:t> </a:t>
-            </a:r>
-            <a:r>
-              <a:rPr lang="en-US" dirty="0" err="1"/>
+              <a:rPr lang="en-US" sz="1800" dirty="0"/>
+              <a:t> </a:t>
+            </a:r>
+            <a:r>
+              <a:rPr lang="en-US" sz="1800" dirty="0" err="1"/>
               <a:t>biến</a:t>
             </a:r>
             <a:r>
-              <a:rPr lang="en-US" dirty="0"/>
-              <a:t>: 0.1</a:t>
-            </a:r>
-          </a:p>
-          <a:p>
-            <a:r>
-              <a:rPr lang="en-US" dirty="0"/>
-              <a:t>4. </a:t>
-            </a:r>
-            <a:r>
-              <a:rPr lang="en-US" dirty="0" err="1"/>
-              <a:t>Tỷ</a:t>
-            </a:r>
-            <a:r>
-              <a:rPr lang="en-US" dirty="0"/>
-              <a:t> </a:t>
-            </a:r>
-            <a:r>
-              <a:rPr lang="en-US" dirty="0" err="1"/>
-              <a:t>lệ</a:t>
-            </a:r>
-            <a:r>
-              <a:rPr lang="en-US" dirty="0"/>
-              <a:t> </a:t>
-            </a:r>
-            <a:r>
-              <a:rPr lang="en-US" dirty="0" err="1"/>
-              <a:t>lai</a:t>
-            </a:r>
-            <a:r>
-              <a:rPr lang="en-US" dirty="0"/>
-              <a:t> </a:t>
-            </a:r>
-            <a:r>
-              <a:rPr lang="en-US" dirty="0" err="1"/>
-              <a:t>ghép</a:t>
-            </a:r>
-            <a:r>
-              <a:rPr lang="en-US" dirty="0"/>
-              <a:t>: 0.9</a:t>
-            </a:r>
+              <a:rPr lang="en-US" sz="1800"/>
+              <a:t>. </a:t>
+            </a:r>
+            <a:endParaRPr lang="en-US" sz="1800" dirty="0"/>
           </a:p>
         </p:txBody>
       </p:sp>
     </p:spTree>
     <p:extLst>
       <p:ext uri="{BB962C8B-B14F-4D97-AF65-F5344CB8AC3E}">
-        <p14:creationId xmlns:p14="http://schemas.microsoft.com/office/powerpoint/2010/main" val="2478447095"/>
+        <p14:creationId xmlns:p14="http://schemas.microsoft.com/office/powerpoint/2010/main" val="3450626383"/>
       </p:ext>
     </p:extLst>
   </p:cSld>

</xml_diff>

<commit_message>
edited pptx and main
</commit_message>
<xml_diff>
--- a/Tối ưu hóa.pptx
+++ b/Tối ưu hóa.pptx
@@ -10,8 +10,10 @@
     <p:sldId id="257" r:id="rId4"/>
     <p:sldId id="260" r:id="rId5"/>
     <p:sldId id="261" r:id="rId6"/>
-    <p:sldId id="263" r:id="rId7"/>
-    <p:sldId id="264" r:id="rId8"/>
+    <p:sldId id="265" r:id="rId7"/>
+    <p:sldId id="263" r:id="rId8"/>
+    <p:sldId id="266" r:id="rId9"/>
+    <p:sldId id="264" r:id="rId10"/>
   </p:sldIdLst>
   <p:sldSz cx="12192000" cy="6858000"/>
   <p:notesSz cx="6858000" cy="9144000"/>
@@ -344,7 +346,7 @@
           <a:p>
             <a:fld id="{4BDF68E2-58F2-4D09-BE8B-E3BD06533059}" type="datetimeFigureOut">
               <a:rPr lang="en-US" dirty="0"/>
-              <a:t>10/29/2023</a:t>
+              <a:t>11/13/2023</a:t>
             </a:fld>
             <a:endParaRPr lang="en-US" dirty="0"/>
           </a:p>
@@ -547,7 +549,7 @@
           <a:p>
             <a:fld id="{2E2D6473-DF6D-4702-B328-E0DD40540A4E}" type="datetimeFigureOut">
               <a:rPr lang="en-US" dirty="0"/>
-              <a:t>10/29/2023</a:t>
+              <a:t>11/13/2023</a:t>
             </a:fld>
             <a:endParaRPr lang="en-US" dirty="0"/>
           </a:p>
@@ -798,7 +800,7 @@
           <a:p>
             <a:fld id="{E26F7E3A-B166-407D-9866-32884E7D5B37}" type="datetimeFigureOut">
               <a:rPr lang="en-US" dirty="0"/>
-              <a:t>10/29/2023</a:t>
+              <a:t>11/13/2023</a:t>
             </a:fld>
             <a:endParaRPr lang="en-US" dirty="0"/>
           </a:p>
@@ -967,7 +969,7 @@
           <a:p>
             <a:fld id="{528FC5F6-F338-4AE4-BB23-26385BCFC423}" type="datetimeFigureOut">
               <a:rPr lang="en-US" dirty="0"/>
-              <a:t>10/29/2023</a:t>
+              <a:t>11/13/2023</a:t>
             </a:fld>
             <a:endParaRPr lang="en-US" dirty="0"/>
           </a:p>
@@ -1305,7 +1307,7 @@
           <a:p>
             <a:fld id="{20EBB0C4-6273-4C6E-B9BD-2EDC30F1CD52}" type="datetimeFigureOut">
               <a:rPr lang="en-US" dirty="0"/>
-              <a:t>10/29/2023</a:t>
+              <a:t>11/13/2023</a:t>
             </a:fld>
             <a:endParaRPr lang="en-US" dirty="0"/>
           </a:p>
@@ -1575,7 +1577,7 @@
           <a:p>
             <a:fld id="{19AB4D41-86C1-4908-B66A-0B50CEB3BF29}" type="datetimeFigureOut">
               <a:rPr lang="en-US" dirty="0"/>
-              <a:t>10/29/2023</a:t>
+              <a:t>11/13/2023</a:t>
             </a:fld>
             <a:endParaRPr lang="en-US" dirty="0"/>
           </a:p>
@@ -1949,7 +1951,7 @@
           <a:p>
             <a:fld id="{E6426E2C-56C1-4E0D-A793-0088A7FDD37E}" type="datetimeFigureOut">
               <a:rPr lang="en-US" dirty="0"/>
-              <a:t>10/29/2023</a:t>
+              <a:t>11/13/2023</a:t>
             </a:fld>
             <a:endParaRPr lang="en-US" dirty="0"/>
           </a:p>
@@ -2062,7 +2064,7 @@
           <a:p>
             <a:fld id="{C8C39B41-D8B5-4052-B551-9B5525EAA8B6}" type="datetimeFigureOut">
               <a:rPr lang="en-US" dirty="0"/>
-              <a:t>10/29/2023</a:t>
+              <a:t>11/13/2023</a:t>
             </a:fld>
             <a:endParaRPr lang="en-US" dirty="0"/>
           </a:p>
@@ -2228,7 +2230,7 @@
           <a:p>
             <a:fld id="{4D94136C-8742-45B2-AF27-D93DF72833A9}" type="datetimeFigureOut">
               <a:rPr lang="en-US" dirty="0"/>
-              <a:t>10/29/2023</a:t>
+              <a:t>11/13/2023</a:t>
             </a:fld>
             <a:endParaRPr lang="en-US" dirty="0"/>
           </a:p>
@@ -2578,7 +2580,7 @@
           <a:p>
             <a:fld id="{32ABBEA6-7C60-4B02-AE87-00D78D8422AF}" type="datetimeFigureOut">
               <a:rPr lang="en-US" dirty="0"/>
-              <a:t>10/29/2023</a:t>
+              <a:t>11/13/2023</a:t>
             </a:fld>
             <a:endParaRPr lang="en-US" dirty="0"/>
           </a:p>
@@ -2956,7 +2958,7 @@
           <a:p>
             <a:fld id="{C9CAD897-D46E-4AD2-BD9B-49DD3E640873}" type="datetimeFigureOut">
               <a:rPr lang="en-US" dirty="0"/>
-              <a:t>10/29/2023</a:t>
+              <a:t>11/13/2023</a:t>
             </a:fld>
             <a:endParaRPr lang="en-US" dirty="0"/>
           </a:p>
@@ -3238,7 +3240,7 @@
           <a:p>
             <a:fld id="{98624D31-43A5-475A-80CF-332C9F6DCF35}" type="datetimeFigureOut">
               <a:rPr lang="en-US" dirty="0"/>
-              <a:t>10/29/2023</a:t>
+              <a:t>11/13/2023</a:t>
             </a:fld>
             <a:endParaRPr lang="en-US" dirty="0"/>
           </a:p>
@@ -3869,7 +3871,7 @@
             </a:r>
             <a:r>
               <a:rPr lang="en-US" dirty="0"/>
-              <a:t>: </a:t>
+              <a:t>: NGHIÊM NGUYỄN VIỆT DŨNG</a:t>
             </a:r>
           </a:p>
         </p:txBody>
@@ -6350,59 +6352,129 @@
             </a:r>
             <a:r>
               <a:rPr lang="en-US" sz="1800" dirty="0"/>
+              <a:t>:  </a:t>
+            </a:r>
+            <a:r>
+              <a:rPr lang="en-US" sz="1800" dirty="0" err="1"/>
+              <a:t>Toạ</a:t>
+            </a:r>
+            <a:r>
+              <a:rPr lang="en-US" sz="1800" dirty="0"/>
+              <a:t> </a:t>
+            </a:r>
+            <a:r>
+              <a:rPr lang="en-US" sz="1800" dirty="0" err="1"/>
+              <a:t>độ</a:t>
+            </a:r>
+            <a:r>
+              <a:rPr lang="en-US" sz="1800" dirty="0"/>
+              <a:t> của 535 </a:t>
+            </a:r>
+            <a:r>
+              <a:rPr lang="en-US" sz="1800" dirty="0" err="1"/>
+              <a:t>sân</a:t>
+            </a:r>
+            <a:r>
+              <a:rPr lang="en-US" sz="1800" dirty="0"/>
+              <a:t> bay </a:t>
+            </a:r>
+            <a:r>
+              <a:rPr lang="en-US" sz="1800" dirty="0" err="1"/>
+              <a:t>khác</a:t>
+            </a:r>
+            <a:r>
+              <a:rPr lang="en-US" sz="1800" dirty="0"/>
+              <a:t> </a:t>
+            </a:r>
+            <a:r>
+              <a:rPr lang="en-US" sz="1800" dirty="0" err="1"/>
+              <a:t>nhau</a:t>
+            </a:r>
+            <a:r>
+              <a:rPr lang="en-US" sz="1800" dirty="0"/>
+              <a:t> </a:t>
+            </a:r>
+            <a:r>
+              <a:rPr lang="en-US" sz="1800" dirty="0" err="1"/>
+              <a:t>trên</a:t>
+            </a:r>
+            <a:r>
+              <a:rPr lang="en-US" sz="1800" dirty="0"/>
+              <a:t> </a:t>
+            </a:r>
+            <a:r>
+              <a:rPr lang="en-US" sz="1800" dirty="0" err="1"/>
+              <a:t>thế</a:t>
+            </a:r>
+            <a:r>
+              <a:rPr lang="en-US" sz="1800" dirty="0"/>
+              <a:t> </a:t>
+            </a:r>
+            <a:r>
+              <a:rPr lang="en-US" sz="1800" dirty="0" err="1"/>
+              <a:t>giới</a:t>
+            </a:r>
+            <a:r>
+              <a:rPr lang="en-US" sz="1800" dirty="0"/>
+              <a:t>, </a:t>
+            </a:r>
+            <a:r>
+              <a:rPr lang="en-US" sz="1800" dirty="0" err="1"/>
+              <a:t>nguồn</a:t>
+            </a:r>
+            <a:r>
+              <a:rPr lang="en-US" sz="1800" dirty="0"/>
               <a:t>: </a:t>
             </a:r>
             <a:r>
               <a:rPr lang="en-US" sz="1800" dirty="0" err="1"/>
-              <a:t>Gồm</a:t>
-            </a:r>
-            <a:r>
-              <a:rPr lang="en-US" sz="1800" dirty="0"/>
-              <a:t> </a:t>
-            </a:r>
-            <a:r>
-              <a:rPr lang="en-US" sz="1800" dirty="0" err="1"/>
-              <a:t>tọa</a:t>
-            </a:r>
-            <a:r>
-              <a:rPr lang="en-US" sz="1800" dirty="0"/>
-              <a:t> </a:t>
-            </a:r>
-            <a:r>
-              <a:rPr lang="en-US" sz="1800" dirty="0" err="1"/>
-              <a:t>độ</a:t>
-            </a:r>
-            <a:r>
-              <a:rPr lang="en-US" sz="1800" dirty="0"/>
-              <a:t> của 51 </a:t>
-            </a:r>
-            <a:r>
-              <a:rPr lang="en-US" sz="1800" dirty="0" err="1"/>
-              <a:t>thành</a:t>
-            </a:r>
-            <a:r>
-              <a:rPr lang="en-US" sz="1800" dirty="0"/>
-              <a:t> </a:t>
-            </a:r>
-            <a:r>
-              <a:rPr lang="en-US" sz="1800" dirty="0" err="1"/>
-              <a:t>phố</a:t>
-            </a:r>
-            <a:r>
-              <a:rPr lang="en-US" sz="1800" dirty="0"/>
-              <a:t> </a:t>
-            </a:r>
-            <a:r>
-              <a:rPr lang="en-US" sz="1800" dirty="0" err="1"/>
-              <a:t>khác</a:t>
-            </a:r>
-            <a:r>
-              <a:rPr lang="en-US" sz="1800" dirty="0"/>
-              <a:t> </a:t>
-            </a:r>
-            <a:r>
-              <a:rPr lang="en-US" sz="1800" dirty="0" err="1"/>
-              <a:t>nhau</a:t>
+              <a:t>TSPLib</a:t>
+            </a:r>
+            <a:endParaRPr lang="en-US" sz="1800" dirty="0"/>
+          </a:p>
+          <a:p>
+            <a:r>
+              <a:rPr lang="en-US" sz="1800" dirty="0"/>
+              <a:t>II. </a:t>
+            </a:r>
+            <a:r>
+              <a:rPr lang="en-US" sz="1800" dirty="0" err="1"/>
+              <a:t>Thực</a:t>
+            </a:r>
+            <a:r>
+              <a:rPr lang="en-US" sz="1800" dirty="0"/>
+              <a:t> </a:t>
+            </a:r>
+            <a:r>
+              <a:rPr lang="en-US" sz="1800" dirty="0" err="1"/>
+              <a:t>nghiệm</a:t>
+            </a:r>
+            <a:endParaRPr lang="en-US" sz="1800" dirty="0"/>
+          </a:p>
+          <a:p>
+            <a:r>
+              <a:rPr lang="en-US" sz="1800" dirty="0"/>
+              <a:t>  1. </a:t>
+            </a:r>
+            <a:r>
+              <a:rPr lang="en-US" sz="1800" dirty="0" err="1"/>
+              <a:t>Quần</a:t>
+            </a:r>
+            <a:r>
+              <a:rPr lang="en-US" sz="1800" dirty="0"/>
+              <a:t> </a:t>
+            </a:r>
+            <a:r>
+              <a:rPr lang="en-US" sz="1800" dirty="0" err="1"/>
+              <a:t>thể</a:t>
+            </a:r>
+            <a:r>
+              <a:rPr lang="en-US" sz="1800" dirty="0"/>
+              <a:t> ban </a:t>
+            </a:r>
+            <a:r>
+              <a:rPr lang="en-US" sz="1800" dirty="0" err="1"/>
+              <a:t>đầu</a:t>
             </a:r>
             <a:r>
               <a:rPr lang="en-US" sz="1800" dirty="0"/>
@@ -6441,67 +6513,71 @@
           <a:p>
             <a:r>
               <a:rPr lang="en-US" sz="1800" dirty="0"/>
-              <a:t>I. </a:t>
-            </a:r>
-            <a:r>
-              <a:rPr lang="en-US" sz="1800" dirty="0" err="1"/>
-              <a:t>Các</a:t>
-            </a:r>
-            <a:r>
-              <a:rPr lang="en-US" sz="1800" dirty="0"/>
-              <a:t> </a:t>
-            </a:r>
-            <a:r>
-              <a:rPr lang="en-US" sz="1800" dirty="0" err="1"/>
-              <a:t>tham</a:t>
-            </a:r>
-            <a:r>
-              <a:rPr lang="en-US" sz="1800" dirty="0"/>
-              <a:t> số</a:t>
-            </a:r>
-          </a:p>
-          <a:p>
-            <a:r>
-              <a:rPr lang="en-US" sz="1800" dirty="0"/>
-              <a:t>  1. Số </a:t>
-            </a:r>
-            <a:r>
-              <a:rPr lang="en-US" sz="1800" dirty="0" err="1"/>
-              <a:t>lượng</a:t>
-            </a:r>
-            <a:r>
-              <a:rPr lang="en-US" sz="1800" dirty="0"/>
-              <a:t> </a:t>
-            </a:r>
-            <a:r>
-              <a:rPr lang="en-US" sz="1800" dirty="0" err="1"/>
-              <a:t>thế</a:t>
-            </a:r>
-            <a:r>
-              <a:rPr lang="en-US" sz="1800" dirty="0"/>
-              <a:t> </a:t>
-            </a:r>
-            <a:r>
-              <a:rPr lang="en-US" sz="1800" dirty="0" err="1"/>
-              <a:t>hệ</a:t>
-            </a:r>
-            <a:r>
-              <a:rPr lang="en-US" sz="1800" dirty="0"/>
-              <a:t>: 200</a:t>
-            </a:r>
-          </a:p>
-          <a:p>
-            <a:r>
-              <a:rPr lang="en-US" sz="1800" dirty="0"/>
-              <a:t>  2. Số </a:t>
-            </a:r>
-            <a:r>
-              <a:rPr lang="en-US" sz="1800" dirty="0" err="1"/>
-              <a:t>lượng</a:t>
-            </a:r>
-            <a:r>
-              <a:rPr lang="en-US" sz="1800" dirty="0"/>
-              <a:t> </a:t>
+              <a:t>  2. </a:t>
+            </a:r>
+            <a:r>
+              <a:rPr lang="en-US" sz="1800" dirty="0" err="1"/>
+              <a:t>Chọn</a:t>
+            </a:r>
+            <a:r>
+              <a:rPr lang="en-US" sz="1800" dirty="0"/>
+              <a:t> cha </a:t>
+            </a:r>
+            <a:r>
+              <a:rPr lang="en-US" sz="1800" dirty="0" err="1"/>
+              <a:t>mẹ</a:t>
+            </a:r>
+            <a:r>
+              <a:rPr lang="en-US" sz="1800" dirty="0"/>
+              <a:t> </a:t>
+            </a:r>
+            <a:r>
+              <a:rPr lang="en-US" sz="1800" dirty="0" err="1"/>
+              <a:t>để</a:t>
+            </a:r>
+            <a:r>
+              <a:rPr lang="en-US" sz="1800" dirty="0"/>
+              <a:t> </a:t>
+            </a:r>
+            <a:r>
+              <a:rPr lang="en-US" sz="1800" dirty="0" err="1"/>
+              <a:t>lai</a:t>
+            </a:r>
+            <a:r>
+              <a:rPr lang="en-US" sz="1800" dirty="0"/>
+              <a:t> </a:t>
+            </a:r>
+            <a:r>
+              <a:rPr lang="en-US" sz="1800" dirty="0" err="1"/>
+              <a:t>ghép</a:t>
+            </a:r>
+            <a:r>
+              <a:rPr lang="en-US" sz="1800" dirty="0"/>
+              <a:t> </a:t>
+            </a:r>
+            <a:r>
+              <a:rPr lang="en-US" sz="1800" dirty="0" err="1"/>
+              <a:t>bằng</a:t>
+            </a:r>
+            <a:r>
+              <a:rPr lang="en-US" sz="1800" dirty="0"/>
+              <a:t> tournament selection </a:t>
+            </a:r>
+            <a:r>
+              <a:rPr lang="en-US" sz="1800" dirty="0" err="1"/>
+              <a:t>và</a:t>
+            </a:r>
+            <a:r>
+              <a:rPr lang="en-US" sz="1800" dirty="0"/>
+              <a:t> </a:t>
+            </a:r>
+            <a:r>
+              <a:rPr lang="en-US" sz="1800" dirty="0" err="1"/>
+              <a:t>tạo</a:t>
+            </a:r>
+            <a:r>
+              <a:rPr lang="en-US" sz="1800" dirty="0"/>
+              <a:t> 2 </a:t>
             </a:r>
             <a:r>
               <a:rPr lang="en-US" sz="1800" dirty="0" err="1"/>
@@ -6517,15 +6593,123 @@
             </a:r>
             <a:r>
               <a:rPr lang="en-US" sz="1800" dirty="0"/>
-              <a:t> </a:t>
-            </a:r>
-            <a:r>
-              <a:rPr lang="en-US" sz="1800" dirty="0" err="1"/>
-              <a:t>trong</a:t>
-            </a:r>
-            <a:r>
-              <a:rPr lang="en-US" sz="1800" dirty="0"/>
-              <a:t> 1 </a:t>
+              <a:t> con</a:t>
+            </a:r>
+          </a:p>
+          <a:p>
+            <a:r>
+              <a:rPr lang="en-US" sz="1800" dirty="0"/>
+              <a:t>  3. </a:t>
+            </a:r>
+            <a:r>
+              <a:rPr lang="en-US" sz="1800" dirty="0" err="1"/>
+              <a:t>Đột</a:t>
+            </a:r>
+            <a:r>
+              <a:rPr lang="en-US" sz="1800" dirty="0"/>
+              <a:t> </a:t>
+            </a:r>
+            <a:r>
+              <a:rPr lang="en-US" sz="1800" dirty="0" err="1"/>
+              <a:t>biến</a:t>
+            </a:r>
+            <a:r>
+              <a:rPr lang="en-US" sz="1800" dirty="0"/>
+              <a:t> 2 </a:t>
+            </a:r>
+            <a:r>
+              <a:rPr lang="en-US" sz="1800" dirty="0" err="1"/>
+              <a:t>cá</a:t>
+            </a:r>
+            <a:r>
+              <a:rPr lang="en-US" sz="1800" dirty="0"/>
+              <a:t> </a:t>
+            </a:r>
+            <a:r>
+              <a:rPr lang="en-US" sz="1800" dirty="0" err="1"/>
+              <a:t>thể</a:t>
+            </a:r>
+            <a:r>
+              <a:rPr lang="en-US" sz="1800" dirty="0"/>
+              <a:t> con </a:t>
+            </a:r>
+            <a:r>
+              <a:rPr lang="en-US" sz="1800" dirty="0" err="1"/>
+              <a:t>được</a:t>
+            </a:r>
+            <a:r>
+              <a:rPr lang="en-US" sz="1800" dirty="0"/>
+              <a:t> </a:t>
+            </a:r>
+            <a:r>
+              <a:rPr lang="en-US" sz="1800" dirty="0" err="1"/>
+              <a:t>lai</a:t>
+            </a:r>
+            <a:r>
+              <a:rPr lang="en-US" sz="1800" dirty="0"/>
+              <a:t> </a:t>
+            </a:r>
+            <a:r>
+              <a:rPr lang="en-US" sz="1800" dirty="0" err="1"/>
+              <a:t>ghép</a:t>
+            </a:r>
+            <a:r>
+              <a:rPr lang="en-US" sz="1800" dirty="0"/>
+              <a:t> </a:t>
+            </a:r>
+            <a:r>
+              <a:rPr lang="en-US" sz="1800" dirty="0" err="1"/>
+              <a:t>sau</a:t>
+            </a:r>
+            <a:r>
+              <a:rPr lang="en-US" sz="1800" dirty="0"/>
+              <a:t> </a:t>
+            </a:r>
+            <a:r>
+              <a:rPr lang="en-US" sz="1800" dirty="0" err="1"/>
+              <a:t>bước</a:t>
+            </a:r>
+            <a:r>
+              <a:rPr lang="en-US" sz="1800" dirty="0"/>
+              <a:t> 2</a:t>
+            </a:r>
+          </a:p>
+          <a:p>
+            <a:r>
+              <a:rPr lang="en-US" sz="1800" dirty="0"/>
+              <a:t>  4. </a:t>
+            </a:r>
+            <a:r>
+              <a:rPr lang="en-US" sz="1800" dirty="0" err="1"/>
+              <a:t>Thêm</a:t>
+            </a:r>
+            <a:r>
+              <a:rPr lang="en-US" sz="1800" dirty="0"/>
+              <a:t> 2 </a:t>
+            </a:r>
+            <a:r>
+              <a:rPr lang="en-US" sz="1800" dirty="0" err="1"/>
+              <a:t>cá</a:t>
+            </a:r>
+            <a:r>
+              <a:rPr lang="en-US" sz="1800" dirty="0"/>
+              <a:t> </a:t>
+            </a:r>
+            <a:r>
+              <a:rPr lang="en-US" sz="1800" dirty="0" err="1"/>
+              <a:t>thể</a:t>
+            </a:r>
+            <a:r>
+              <a:rPr lang="en-US" sz="1800" dirty="0"/>
+              <a:t> con </a:t>
+            </a:r>
+            <a:r>
+              <a:rPr lang="en-US" sz="1800" dirty="0" err="1"/>
+              <a:t>vào</a:t>
+            </a:r>
+            <a:r>
+              <a:rPr lang="en-US" sz="1800" dirty="0"/>
+              <a:t> </a:t>
             </a:r>
             <a:r>
               <a:rPr lang="en-US" sz="1800" dirty="0" err="1"/>
@@ -6541,256 +6725,20 @@
             </a:r>
             <a:r>
               <a:rPr lang="en-US" sz="1800" dirty="0"/>
-              <a:t>: 2000</a:t>
-            </a:r>
-          </a:p>
-          <a:p>
-            <a:r>
-              <a:rPr lang="en-US" sz="1800" dirty="0"/>
-              <a:t>  3. </a:t>
-            </a:r>
-            <a:r>
-              <a:rPr lang="en-US" sz="1800" dirty="0" err="1"/>
-              <a:t>Tỷ</a:t>
-            </a:r>
-            <a:r>
-              <a:rPr lang="en-US" sz="1800" dirty="0"/>
-              <a:t> </a:t>
-            </a:r>
-            <a:r>
-              <a:rPr lang="en-US" sz="1800" dirty="0" err="1"/>
-              <a:t>lệ</a:t>
-            </a:r>
-            <a:r>
-              <a:rPr lang="en-US" sz="1800" dirty="0"/>
-              <a:t> </a:t>
-            </a:r>
-            <a:r>
-              <a:rPr lang="en-US" sz="1800" dirty="0" err="1"/>
-              <a:t>đột</a:t>
-            </a:r>
-            <a:r>
-              <a:rPr lang="en-US" sz="1800" dirty="0"/>
-              <a:t> </a:t>
-            </a:r>
-            <a:r>
-              <a:rPr lang="en-US" sz="1800" dirty="0" err="1"/>
-              <a:t>biến</a:t>
-            </a:r>
-            <a:r>
-              <a:rPr lang="en-US" sz="1800" dirty="0"/>
-              <a:t>: 0.1</a:t>
-            </a:r>
-          </a:p>
-          <a:p>
-            <a:r>
-              <a:rPr lang="en-US" sz="1800" dirty="0"/>
-              <a:t>  4. </a:t>
-            </a:r>
-            <a:r>
-              <a:rPr lang="en-US" sz="1800" dirty="0" err="1"/>
-              <a:t>Tỷ</a:t>
-            </a:r>
-            <a:r>
-              <a:rPr lang="en-US" sz="1800" dirty="0"/>
-              <a:t> </a:t>
-            </a:r>
-            <a:r>
-              <a:rPr lang="en-US" sz="1800" dirty="0" err="1"/>
-              <a:t>lệ</a:t>
-            </a:r>
-            <a:r>
-              <a:rPr lang="en-US" sz="1800" dirty="0"/>
-              <a:t> </a:t>
-            </a:r>
-            <a:r>
-              <a:rPr lang="en-US" sz="1800" dirty="0" err="1"/>
-              <a:t>lai</a:t>
-            </a:r>
-            <a:r>
-              <a:rPr lang="en-US" sz="1800" dirty="0"/>
-              <a:t> </a:t>
-            </a:r>
-            <a:r>
-              <a:rPr lang="en-US" sz="1800" dirty="0" err="1"/>
-              <a:t>ghép</a:t>
-            </a:r>
-            <a:r>
-              <a:rPr lang="en-US" sz="1800" dirty="0"/>
-              <a:t>: 0.9</a:t>
-            </a:r>
-          </a:p>
-          <a:p>
-            <a:r>
-              <a:rPr lang="en-US" sz="1800" dirty="0"/>
-              <a:t>II. </a:t>
-            </a:r>
-            <a:r>
-              <a:rPr lang="en-US" sz="1800" dirty="0" err="1"/>
-              <a:t>Kết</a:t>
-            </a:r>
-            <a:r>
-              <a:rPr lang="en-US" sz="1800" dirty="0"/>
-              <a:t> </a:t>
-            </a:r>
-            <a:r>
-              <a:rPr lang="en-US" sz="1800" dirty="0" err="1"/>
-              <a:t>quả</a:t>
-            </a:r>
-            <a:r>
-              <a:rPr lang="en-US" sz="1800" dirty="0"/>
-              <a:t> </a:t>
-            </a:r>
-            <a:r>
-              <a:rPr lang="en-US" sz="1800" dirty="0" err="1"/>
-              <a:t>thực</a:t>
-            </a:r>
-            <a:r>
-              <a:rPr lang="en-US" sz="1800" dirty="0"/>
-              <a:t> </a:t>
-            </a:r>
-            <a:r>
-              <a:rPr lang="en-US" sz="1800" dirty="0" err="1"/>
-              <a:t>nghiệm</a:t>
+              <a:t> </a:t>
+            </a:r>
+            <a:r>
+              <a:rPr lang="en-US" sz="1800" dirty="0" err="1"/>
+              <a:t>mới</a:t>
             </a:r>
             <a:endParaRPr lang="en-US" sz="1800" dirty="0"/>
           </a:p>
-          <a:p>
-            <a:r>
-              <a:rPr lang="en-US" sz="1800" dirty="0"/>
-              <a:t>- </a:t>
-            </a:r>
-            <a:r>
-              <a:rPr lang="en-US" sz="1800" dirty="0" err="1"/>
-              <a:t>Kết</a:t>
-            </a:r>
-            <a:r>
-              <a:rPr lang="en-US" sz="1800" dirty="0"/>
-              <a:t> </a:t>
-            </a:r>
-            <a:r>
-              <a:rPr lang="en-US" sz="1800" dirty="0" err="1"/>
-              <a:t>quả</a:t>
-            </a:r>
-            <a:r>
-              <a:rPr lang="en-US" sz="1800" dirty="0"/>
-              <a:t> </a:t>
-            </a:r>
-            <a:r>
-              <a:rPr lang="en-US" sz="1800" dirty="0" err="1"/>
-              <a:t>sau</a:t>
-            </a:r>
-            <a:r>
-              <a:rPr lang="en-US" sz="1800" dirty="0"/>
-              <a:t> </a:t>
-            </a:r>
-            <a:r>
-              <a:rPr lang="en-US" sz="1800" dirty="0" err="1"/>
-              <a:t>một</a:t>
-            </a:r>
-            <a:r>
-              <a:rPr lang="en-US" sz="1800" dirty="0"/>
-              <a:t> </a:t>
-            </a:r>
-            <a:r>
-              <a:rPr lang="en-US" sz="1800" dirty="0" err="1"/>
-              <a:t>thế</a:t>
-            </a:r>
-            <a:r>
-              <a:rPr lang="en-US" sz="1800" dirty="0"/>
-              <a:t> </a:t>
-            </a:r>
-            <a:r>
-              <a:rPr lang="en-US" sz="1800" dirty="0" err="1"/>
-              <a:t>hệ</a:t>
-            </a:r>
-            <a:r>
-              <a:rPr lang="en-US" sz="1800" dirty="0"/>
-              <a:t>: 1363.66</a:t>
-            </a:r>
-          </a:p>
-          <a:p>
-            <a:r>
-              <a:rPr lang="en-US" sz="1800" dirty="0"/>
-              <a:t>- </a:t>
-            </a:r>
-            <a:r>
-              <a:rPr lang="en-US" sz="1800" dirty="0" err="1"/>
-              <a:t>Kết</a:t>
-            </a:r>
-            <a:r>
-              <a:rPr lang="en-US" sz="1800" dirty="0"/>
-              <a:t> </a:t>
-            </a:r>
-            <a:r>
-              <a:rPr lang="en-US" sz="1800" dirty="0" err="1"/>
-              <a:t>quả</a:t>
-            </a:r>
-            <a:r>
-              <a:rPr lang="en-US" sz="1800" dirty="0"/>
-              <a:t> </a:t>
-            </a:r>
-            <a:r>
-              <a:rPr lang="en-US" sz="1800" dirty="0" err="1"/>
-              <a:t>sau</a:t>
-            </a:r>
-            <a:r>
-              <a:rPr lang="en-US" sz="1800" dirty="0"/>
-              <a:t> 200 </a:t>
-            </a:r>
-            <a:r>
-              <a:rPr lang="en-US" sz="1800" dirty="0" err="1"/>
-              <a:t>thế</a:t>
-            </a:r>
-            <a:r>
-              <a:rPr lang="en-US" sz="1800" dirty="0"/>
-              <a:t> </a:t>
-            </a:r>
-            <a:r>
-              <a:rPr lang="en-US" sz="1800" dirty="0" err="1"/>
-              <a:t>hệ</a:t>
-            </a:r>
-            <a:r>
-              <a:rPr lang="en-US" sz="1800" dirty="0"/>
-              <a:t>: 499.62</a:t>
-            </a:r>
-          </a:p>
         </p:txBody>
       </p:sp>
-      <p:pic>
-        <p:nvPicPr>
-          <p:cNvPr id="5" name="Picture 4">
-            <a:extLst>
-              <a:ext uri="{FF2B5EF4-FFF2-40B4-BE49-F238E27FC236}">
-                <a16:creationId xmlns:a16="http://schemas.microsoft.com/office/drawing/2014/main" id="{0F969EF4-86DA-2C81-DB65-BE3D760F9640}"/>
-              </a:ext>
-            </a:extLst>
-          </p:cNvPr>
-          <p:cNvPicPr>
-            <a:picLocks noChangeAspect="1"/>
-          </p:cNvPicPr>
-          <p:nvPr/>
-        </p:nvPicPr>
-        <p:blipFill>
-          <a:blip r:embed="rId2"/>
-          <a:stretch>
-            <a:fillRect/>
-          </a:stretch>
-        </p:blipFill>
-        <p:spPr>
-          <a:xfrm>
-            <a:off x="6366454" y="2233146"/>
-            <a:ext cx="4728266" cy="4045295"/>
-          </a:xfrm>
-          <a:prstGeom prst="rect">
-            <a:avLst/>
-          </a:prstGeom>
-        </p:spPr>
-      </p:pic>
     </p:spTree>
     <p:extLst>
       <p:ext uri="{BB962C8B-B14F-4D97-AF65-F5344CB8AC3E}">
-        <p14:creationId xmlns:p14="http://schemas.microsoft.com/office/powerpoint/2010/main" val="2478447095"/>
+        <p14:creationId xmlns:p14="http://schemas.microsoft.com/office/powerpoint/2010/main" val="2137731373"/>
       </p:ext>
     </p:extLst>
   </p:cSld>
@@ -6840,6 +6788,1068 @@
           <a:p>
             <a:r>
               <a:rPr lang="en-US" dirty="0" err="1"/>
+              <a:t>Thực</a:t>
+            </a:r>
+            <a:r>
+              <a:rPr lang="en-US" dirty="0"/>
+              <a:t> </a:t>
+            </a:r>
+            <a:r>
+              <a:rPr lang="en-US" dirty="0" err="1"/>
+              <a:t>nghiệm</a:t>
+            </a:r>
+            <a:endParaRPr lang="en-US" dirty="0"/>
+          </a:p>
+        </p:txBody>
+      </p:sp>
+      <p:graphicFrame>
+        <p:nvGraphicFramePr>
+          <p:cNvPr id="8" name="Content Placeholder 7">
+            <a:extLst>
+              <a:ext uri="{FF2B5EF4-FFF2-40B4-BE49-F238E27FC236}">
+                <a16:creationId xmlns:a16="http://schemas.microsoft.com/office/drawing/2014/main" id="{1C075279-ECEF-F489-7D4A-784151604D2E}"/>
+              </a:ext>
+            </a:extLst>
+          </p:cNvPr>
+          <p:cNvGraphicFramePr>
+            <a:graphicFrameLocks noGrp="1"/>
+          </p:cNvGraphicFramePr>
+          <p:nvPr>
+            <p:ph idx="1"/>
+            <p:extLst>
+              <p:ext uri="{D42A27DB-BD31-4B8C-83A1-F6EECF244321}">
+                <p14:modId xmlns:p14="http://schemas.microsoft.com/office/powerpoint/2010/main" val="2141381456"/>
+              </p:ext>
+            </p:extLst>
+          </p:nvPr>
+        </p:nvGraphicFramePr>
+        <p:xfrm>
+          <a:off x="1096963" y="1846263"/>
+          <a:ext cx="10058400" cy="2865120"/>
+        </p:xfrm>
+        <a:graphic>
+          <a:graphicData uri="http://schemas.openxmlformats.org/drawingml/2006/table">
+            <a:tbl>
+              <a:tblPr firstRow="1" bandRow="1">
+                <a:tableStyleId>{5C22544A-7EE6-4342-B048-85BDC9FD1C3A}</a:tableStyleId>
+              </a:tblPr>
+              <a:tblGrid>
+                <a:gridCol w="2011680">
+                  <a:extLst>
+                    <a:ext uri="{9D8B030D-6E8A-4147-A177-3AD203B41FA5}">
+                      <a16:colId xmlns:a16="http://schemas.microsoft.com/office/drawing/2014/main" val="1159259249"/>
+                    </a:ext>
+                  </a:extLst>
+                </a:gridCol>
+                <a:gridCol w="2011680">
+                  <a:extLst>
+                    <a:ext uri="{9D8B030D-6E8A-4147-A177-3AD203B41FA5}">
+                      <a16:colId xmlns:a16="http://schemas.microsoft.com/office/drawing/2014/main" val="1816344274"/>
+                    </a:ext>
+                  </a:extLst>
+                </a:gridCol>
+                <a:gridCol w="2011680">
+                  <a:extLst>
+                    <a:ext uri="{9D8B030D-6E8A-4147-A177-3AD203B41FA5}">
+                      <a16:colId xmlns:a16="http://schemas.microsoft.com/office/drawing/2014/main" val="1588582400"/>
+                    </a:ext>
+                  </a:extLst>
+                </a:gridCol>
+                <a:gridCol w="2011680">
+                  <a:extLst>
+                    <a:ext uri="{9D8B030D-6E8A-4147-A177-3AD203B41FA5}">
+                      <a16:colId xmlns:a16="http://schemas.microsoft.com/office/drawing/2014/main" val="306087785"/>
+                    </a:ext>
+                  </a:extLst>
+                </a:gridCol>
+                <a:gridCol w="2011680">
+                  <a:extLst>
+                    <a:ext uri="{9D8B030D-6E8A-4147-A177-3AD203B41FA5}">
+                      <a16:colId xmlns:a16="http://schemas.microsoft.com/office/drawing/2014/main" val="3301681197"/>
+                    </a:ext>
+                  </a:extLst>
+                </a:gridCol>
+              </a:tblGrid>
+              <a:tr h="370840">
+                <a:tc>
+                  <a:txBody>
+                    <a:bodyPr/>
+                    <a:lstStyle/>
+                    <a:p>
+                      <a:r>
+                        <a:rPr lang="en-US" dirty="0"/>
+                        <a:t>Số </a:t>
+                      </a:r>
+                      <a:r>
+                        <a:rPr lang="en-US" dirty="0" err="1"/>
+                        <a:t>lượng</a:t>
+                      </a:r>
+                      <a:r>
+                        <a:rPr lang="en-US" dirty="0"/>
+                        <a:t> </a:t>
+                      </a:r>
+                      <a:r>
+                        <a:rPr lang="en-US" dirty="0" err="1"/>
+                        <a:t>thế</a:t>
+                      </a:r>
+                      <a:r>
+                        <a:rPr lang="en-US" dirty="0"/>
+                        <a:t> </a:t>
+                      </a:r>
+                      <a:r>
+                        <a:rPr lang="en-US" dirty="0" err="1"/>
+                        <a:t>hệ</a:t>
+                      </a:r>
+                      <a:endParaRPr lang="en-US" dirty="0"/>
+                    </a:p>
+                  </a:txBody>
+                  <a:tcPr/>
+                </a:tc>
+                <a:tc>
+                  <a:txBody>
+                    <a:bodyPr/>
+                    <a:lstStyle/>
+                    <a:p>
+                      <a:r>
+                        <a:rPr lang="en-US" dirty="0" err="1"/>
+                        <a:t>Kích</a:t>
+                      </a:r>
+                      <a:r>
+                        <a:rPr lang="en-US" dirty="0"/>
+                        <a:t> </a:t>
+                      </a:r>
+                      <a:r>
+                        <a:rPr lang="en-US" dirty="0" err="1"/>
+                        <a:t>thước</a:t>
+                      </a:r>
+                      <a:r>
+                        <a:rPr lang="en-US" dirty="0"/>
+                        <a:t> </a:t>
+                      </a:r>
+                      <a:r>
+                        <a:rPr lang="en-US" dirty="0" err="1"/>
+                        <a:t>quần</a:t>
+                      </a:r>
+                      <a:r>
+                        <a:rPr lang="en-US" dirty="0"/>
+                        <a:t> </a:t>
+                      </a:r>
+                      <a:r>
+                        <a:rPr lang="en-US" dirty="0" err="1"/>
+                        <a:t>thể</a:t>
+                      </a:r>
+                      <a:endParaRPr lang="en-US" dirty="0"/>
+                    </a:p>
+                  </a:txBody>
+                  <a:tcPr/>
+                </a:tc>
+                <a:tc>
+                  <a:txBody>
+                    <a:bodyPr/>
+                    <a:lstStyle/>
+                    <a:p>
+                      <a:r>
+                        <a:rPr lang="en-US" dirty="0" err="1"/>
+                        <a:t>Tỷ</a:t>
+                      </a:r>
+                      <a:r>
+                        <a:rPr lang="en-US" dirty="0"/>
+                        <a:t> </a:t>
+                      </a:r>
+                      <a:r>
+                        <a:rPr lang="en-US" dirty="0" err="1"/>
+                        <a:t>lệ</a:t>
+                      </a:r>
+                      <a:r>
+                        <a:rPr lang="en-US" dirty="0"/>
+                        <a:t> </a:t>
+                      </a:r>
+                      <a:r>
+                        <a:rPr lang="en-US" dirty="0" err="1"/>
+                        <a:t>đột</a:t>
+                      </a:r>
+                      <a:r>
+                        <a:rPr lang="en-US" dirty="0"/>
+                        <a:t> </a:t>
+                      </a:r>
+                      <a:r>
+                        <a:rPr lang="en-US" dirty="0" err="1"/>
+                        <a:t>biến</a:t>
+                      </a:r>
+                      <a:endParaRPr lang="en-US" dirty="0"/>
+                    </a:p>
+                  </a:txBody>
+                  <a:tcPr/>
+                </a:tc>
+                <a:tc>
+                  <a:txBody>
+                    <a:bodyPr/>
+                    <a:lstStyle/>
+                    <a:p>
+                      <a:r>
+                        <a:rPr lang="en-US" dirty="0" err="1"/>
+                        <a:t>Kích</a:t>
+                      </a:r>
+                      <a:r>
+                        <a:rPr lang="en-US" dirty="0"/>
+                        <a:t> </a:t>
+                      </a:r>
+                      <a:r>
+                        <a:rPr lang="en-US" dirty="0" err="1"/>
+                        <a:t>thước</a:t>
+                      </a:r>
+                      <a:r>
+                        <a:rPr lang="en-US" dirty="0"/>
+                        <a:t> tournament</a:t>
+                      </a:r>
+                    </a:p>
+                  </a:txBody>
+                  <a:tcPr/>
+                </a:tc>
+                <a:tc>
+                  <a:txBody>
+                    <a:bodyPr/>
+                    <a:lstStyle/>
+                    <a:p>
+                      <a:r>
+                        <a:rPr lang="en-US" dirty="0" err="1"/>
+                        <a:t>Kết</a:t>
+                      </a:r>
+                      <a:r>
+                        <a:rPr lang="en-US" dirty="0"/>
+                        <a:t> </a:t>
+                      </a:r>
+                      <a:r>
+                        <a:rPr lang="en-US" dirty="0" err="1"/>
+                        <a:t>quả</a:t>
+                      </a:r>
+                      <a:endParaRPr lang="en-US" dirty="0"/>
+                    </a:p>
+                  </a:txBody>
+                  <a:tcPr/>
+                </a:tc>
+                <a:extLst>
+                  <a:ext uri="{0D108BD9-81ED-4DB2-BD59-A6C34878D82A}">
+                    <a16:rowId xmlns:a16="http://schemas.microsoft.com/office/drawing/2014/main" val="3791973737"/>
+                  </a:ext>
+                </a:extLst>
+              </a:tr>
+              <a:tr h="370840">
+                <a:tc>
+                  <a:txBody>
+                    <a:bodyPr/>
+                    <a:lstStyle/>
+                    <a:p>
+                      <a:r>
+                        <a:rPr lang="en-US" dirty="0"/>
+                        <a:t>100</a:t>
+                      </a:r>
+                    </a:p>
+                  </a:txBody>
+                  <a:tcPr/>
+                </a:tc>
+                <a:tc>
+                  <a:txBody>
+                    <a:bodyPr/>
+                    <a:lstStyle/>
+                    <a:p>
+                      <a:r>
+                        <a:rPr lang="en-US" dirty="0"/>
+                        <a:t>2000</a:t>
+                      </a:r>
+                    </a:p>
+                  </a:txBody>
+                  <a:tcPr/>
+                </a:tc>
+                <a:tc>
+                  <a:txBody>
+                    <a:bodyPr/>
+                    <a:lstStyle/>
+                    <a:p>
+                      <a:r>
+                        <a:rPr lang="en-US" dirty="0"/>
+                        <a:t>0.1</a:t>
+                      </a:r>
+                    </a:p>
+                  </a:txBody>
+                  <a:tcPr/>
+                </a:tc>
+                <a:tc>
+                  <a:txBody>
+                    <a:bodyPr/>
+                    <a:lstStyle/>
+                    <a:p>
+                      <a:r>
+                        <a:rPr lang="en-US" dirty="0"/>
+                        <a:t>4</a:t>
+                      </a:r>
+                    </a:p>
+                  </a:txBody>
+                  <a:tcPr/>
+                </a:tc>
+                <a:tc>
+                  <a:txBody>
+                    <a:bodyPr/>
+                    <a:lstStyle/>
+                    <a:p>
+                      <a:r>
+                        <a:rPr lang="en-US" dirty="0"/>
+                        <a:t>21721.23</a:t>
+                      </a:r>
+                    </a:p>
+                  </a:txBody>
+                  <a:tcPr/>
+                </a:tc>
+                <a:extLst>
+                  <a:ext uri="{0D108BD9-81ED-4DB2-BD59-A6C34878D82A}">
+                    <a16:rowId xmlns:a16="http://schemas.microsoft.com/office/drawing/2014/main" val="3362166224"/>
+                  </a:ext>
+                </a:extLst>
+              </a:tr>
+              <a:tr h="370840">
+                <a:tc>
+                  <a:txBody>
+                    <a:bodyPr/>
+                    <a:lstStyle/>
+                    <a:p>
+                      <a:r>
+                        <a:rPr lang="en-US" dirty="0"/>
+                        <a:t>200</a:t>
+                      </a:r>
+                    </a:p>
+                  </a:txBody>
+                  <a:tcPr/>
+                </a:tc>
+                <a:tc>
+                  <a:txBody>
+                    <a:bodyPr/>
+                    <a:lstStyle/>
+                    <a:p>
+                      <a:r>
+                        <a:rPr lang="en-US" dirty="0"/>
+                        <a:t>2000</a:t>
+                      </a:r>
+                    </a:p>
+                  </a:txBody>
+                  <a:tcPr/>
+                </a:tc>
+                <a:tc>
+                  <a:txBody>
+                    <a:bodyPr/>
+                    <a:lstStyle/>
+                    <a:p>
+                      <a:r>
+                        <a:rPr lang="en-US" dirty="0"/>
+                        <a:t>0.1</a:t>
+                      </a:r>
+                    </a:p>
+                  </a:txBody>
+                  <a:tcPr/>
+                </a:tc>
+                <a:tc>
+                  <a:txBody>
+                    <a:bodyPr/>
+                    <a:lstStyle/>
+                    <a:p>
+                      <a:r>
+                        <a:rPr lang="en-US" dirty="0"/>
+                        <a:t>4</a:t>
+                      </a:r>
+                    </a:p>
+                  </a:txBody>
+                  <a:tcPr/>
+                </a:tc>
+                <a:tc>
+                  <a:txBody>
+                    <a:bodyPr/>
+                    <a:lstStyle/>
+                    <a:p>
+                      <a:r>
+                        <a:rPr lang="en-US" dirty="0"/>
+                        <a:t>17153.60</a:t>
+                      </a:r>
+                    </a:p>
+                  </a:txBody>
+                  <a:tcPr/>
+                </a:tc>
+                <a:extLst>
+                  <a:ext uri="{0D108BD9-81ED-4DB2-BD59-A6C34878D82A}">
+                    <a16:rowId xmlns:a16="http://schemas.microsoft.com/office/drawing/2014/main" val="1240057630"/>
+                  </a:ext>
+                </a:extLst>
+              </a:tr>
+              <a:tr h="370840">
+                <a:tc>
+                  <a:txBody>
+                    <a:bodyPr/>
+                    <a:lstStyle/>
+                    <a:p>
+                      <a:r>
+                        <a:rPr lang="en-US" dirty="0"/>
+                        <a:t>500</a:t>
+                      </a:r>
+                    </a:p>
+                  </a:txBody>
+                  <a:tcPr/>
+                </a:tc>
+                <a:tc>
+                  <a:txBody>
+                    <a:bodyPr/>
+                    <a:lstStyle/>
+                    <a:p>
+                      <a:r>
+                        <a:rPr lang="en-US" dirty="0"/>
+                        <a:t>2000</a:t>
+                      </a:r>
+                    </a:p>
+                  </a:txBody>
+                  <a:tcPr/>
+                </a:tc>
+                <a:tc>
+                  <a:txBody>
+                    <a:bodyPr/>
+                    <a:lstStyle/>
+                    <a:p>
+                      <a:r>
+                        <a:rPr lang="en-US" dirty="0"/>
+                        <a:t>0.1</a:t>
+                      </a:r>
+                    </a:p>
+                  </a:txBody>
+                  <a:tcPr/>
+                </a:tc>
+                <a:tc>
+                  <a:txBody>
+                    <a:bodyPr/>
+                    <a:lstStyle/>
+                    <a:p>
+                      <a:r>
+                        <a:rPr lang="en-US" dirty="0"/>
+                        <a:t>4</a:t>
+                      </a:r>
+                    </a:p>
+                  </a:txBody>
+                  <a:tcPr/>
+                </a:tc>
+                <a:tc>
+                  <a:txBody>
+                    <a:bodyPr/>
+                    <a:lstStyle/>
+                    <a:p>
+                      <a:r>
+                        <a:rPr lang="en-US" dirty="0"/>
+                        <a:t>12572.73</a:t>
+                      </a:r>
+                    </a:p>
+                  </a:txBody>
+                  <a:tcPr/>
+                </a:tc>
+                <a:extLst>
+                  <a:ext uri="{0D108BD9-81ED-4DB2-BD59-A6C34878D82A}">
+                    <a16:rowId xmlns:a16="http://schemas.microsoft.com/office/drawing/2014/main" val="133934439"/>
+                  </a:ext>
+                </a:extLst>
+              </a:tr>
+              <a:tr h="370840">
+                <a:tc>
+                  <a:txBody>
+                    <a:bodyPr/>
+                    <a:lstStyle/>
+                    <a:p>
+                      <a:r>
+                        <a:rPr lang="en-US" dirty="0"/>
+                        <a:t>100</a:t>
+                      </a:r>
+                    </a:p>
+                  </a:txBody>
+                  <a:tcPr/>
+                </a:tc>
+                <a:tc>
+                  <a:txBody>
+                    <a:bodyPr/>
+                    <a:lstStyle/>
+                    <a:p>
+                      <a:r>
+                        <a:rPr lang="en-US" dirty="0"/>
+                        <a:t>5000</a:t>
+                      </a:r>
+                    </a:p>
+                  </a:txBody>
+                  <a:tcPr/>
+                </a:tc>
+                <a:tc>
+                  <a:txBody>
+                    <a:bodyPr/>
+                    <a:lstStyle/>
+                    <a:p>
+                      <a:r>
+                        <a:rPr lang="en-US" dirty="0"/>
+                        <a:t>0.1</a:t>
+                      </a:r>
+                    </a:p>
+                  </a:txBody>
+                  <a:tcPr/>
+                </a:tc>
+                <a:tc>
+                  <a:txBody>
+                    <a:bodyPr/>
+                    <a:lstStyle/>
+                    <a:p>
+                      <a:r>
+                        <a:rPr lang="en-US" dirty="0"/>
+                        <a:t>4</a:t>
+                      </a:r>
+                    </a:p>
+                  </a:txBody>
+                  <a:tcPr/>
+                </a:tc>
+                <a:tc>
+                  <a:txBody>
+                    <a:bodyPr/>
+                    <a:lstStyle/>
+                    <a:p>
+                      <a:r>
+                        <a:rPr lang="en-US" dirty="0"/>
+                        <a:t>19725.06</a:t>
+                      </a:r>
+                    </a:p>
+                  </a:txBody>
+                  <a:tcPr/>
+                </a:tc>
+                <a:extLst>
+                  <a:ext uri="{0D108BD9-81ED-4DB2-BD59-A6C34878D82A}">
+                    <a16:rowId xmlns:a16="http://schemas.microsoft.com/office/drawing/2014/main" val="3275900150"/>
+                  </a:ext>
+                </a:extLst>
+              </a:tr>
+              <a:tr h="370840">
+                <a:tc>
+                  <a:txBody>
+                    <a:bodyPr/>
+                    <a:lstStyle/>
+                    <a:p>
+                      <a:r>
+                        <a:rPr lang="en-US" dirty="0"/>
+                        <a:t>200</a:t>
+                      </a:r>
+                    </a:p>
+                  </a:txBody>
+                  <a:tcPr/>
+                </a:tc>
+                <a:tc>
+                  <a:txBody>
+                    <a:bodyPr/>
+                    <a:lstStyle/>
+                    <a:p>
+                      <a:r>
+                        <a:rPr lang="en-US" dirty="0"/>
+                        <a:t>5000</a:t>
+                      </a:r>
+                    </a:p>
+                  </a:txBody>
+                  <a:tcPr/>
+                </a:tc>
+                <a:tc>
+                  <a:txBody>
+                    <a:bodyPr/>
+                    <a:lstStyle/>
+                    <a:p>
+                      <a:r>
+                        <a:rPr lang="en-US" dirty="0"/>
+                        <a:t>0.1</a:t>
+                      </a:r>
+                    </a:p>
+                  </a:txBody>
+                  <a:tcPr/>
+                </a:tc>
+                <a:tc>
+                  <a:txBody>
+                    <a:bodyPr/>
+                    <a:lstStyle/>
+                    <a:p>
+                      <a:r>
+                        <a:rPr lang="en-US" dirty="0"/>
+                        <a:t>4</a:t>
+                      </a:r>
+                    </a:p>
+                  </a:txBody>
+                  <a:tcPr/>
+                </a:tc>
+                <a:tc>
+                  <a:txBody>
+                    <a:bodyPr/>
+                    <a:lstStyle/>
+                    <a:p>
+                      <a:r>
+                        <a:rPr lang="en-US" dirty="0"/>
+                        <a:t>16580.82</a:t>
+                      </a:r>
+                    </a:p>
+                  </a:txBody>
+                  <a:tcPr/>
+                </a:tc>
+                <a:extLst>
+                  <a:ext uri="{0D108BD9-81ED-4DB2-BD59-A6C34878D82A}">
+                    <a16:rowId xmlns:a16="http://schemas.microsoft.com/office/drawing/2014/main" val="3842167607"/>
+                  </a:ext>
+                </a:extLst>
+              </a:tr>
+              <a:tr h="370840">
+                <a:tc>
+                  <a:txBody>
+                    <a:bodyPr/>
+                    <a:lstStyle/>
+                    <a:p>
+                      <a:r>
+                        <a:rPr lang="en-US" dirty="0"/>
+                        <a:t>500</a:t>
+                      </a:r>
+                    </a:p>
+                  </a:txBody>
+                  <a:tcPr/>
+                </a:tc>
+                <a:tc>
+                  <a:txBody>
+                    <a:bodyPr/>
+                    <a:lstStyle/>
+                    <a:p>
+                      <a:r>
+                        <a:rPr lang="en-US" dirty="0"/>
+                        <a:t>5000</a:t>
+                      </a:r>
+                    </a:p>
+                  </a:txBody>
+                  <a:tcPr/>
+                </a:tc>
+                <a:tc>
+                  <a:txBody>
+                    <a:bodyPr/>
+                    <a:lstStyle/>
+                    <a:p>
+                      <a:r>
+                        <a:rPr lang="en-US" dirty="0"/>
+                        <a:t>0.1</a:t>
+                      </a:r>
+                    </a:p>
+                  </a:txBody>
+                  <a:tcPr/>
+                </a:tc>
+                <a:tc>
+                  <a:txBody>
+                    <a:bodyPr/>
+                    <a:lstStyle/>
+                    <a:p>
+                      <a:r>
+                        <a:rPr lang="en-US" dirty="0"/>
+                        <a:t>4</a:t>
+                      </a:r>
+                    </a:p>
+                  </a:txBody>
+                  <a:tcPr/>
+                </a:tc>
+                <a:tc>
+                  <a:txBody>
+                    <a:bodyPr/>
+                    <a:lstStyle/>
+                    <a:p>
+                      <a:r>
+                        <a:rPr lang="en-US" dirty="0"/>
+                        <a:t>10641.26</a:t>
+                      </a:r>
+                    </a:p>
+                  </a:txBody>
+                  <a:tcPr/>
+                </a:tc>
+                <a:extLst>
+                  <a:ext uri="{0D108BD9-81ED-4DB2-BD59-A6C34878D82A}">
+                    <a16:rowId xmlns:a16="http://schemas.microsoft.com/office/drawing/2014/main" val="3964820096"/>
+                  </a:ext>
+                </a:extLst>
+              </a:tr>
+            </a:tbl>
+          </a:graphicData>
+        </a:graphic>
+      </p:graphicFrame>
+    </p:spTree>
+    <p:extLst>
+      <p:ext uri="{BB962C8B-B14F-4D97-AF65-F5344CB8AC3E}">
+        <p14:creationId xmlns:p14="http://schemas.microsoft.com/office/powerpoint/2010/main" val="2478447095"/>
+      </p:ext>
+    </p:extLst>
+  </p:cSld>
+  <p:clrMapOvr>
+    <a:masterClrMapping/>
+  </p:clrMapOvr>
+</p:sld>
+</file>
+
+<file path=ppt/slides/slide8.xml><?xml version="1.0" encoding="utf-8"?>
+<p:sld xmlns:a="http://schemas.openxmlformats.org/drawingml/2006/main" xmlns:r="http://schemas.openxmlformats.org/officeDocument/2006/relationships" xmlns:p="http://schemas.openxmlformats.org/presentationml/2006/main">
+  <p:cSld>
+    <p:spTree>
+      <p:nvGrpSpPr>
+        <p:cNvPr id="1" name=""/>
+        <p:cNvGrpSpPr/>
+        <p:nvPr/>
+      </p:nvGrpSpPr>
+      <p:grpSpPr>
+        <a:xfrm>
+          <a:off x="0" y="0"/>
+          <a:ext cx="0" cy="0"/>
+          <a:chOff x="0" y="0"/>
+          <a:chExt cx="0" cy="0"/>
+        </a:xfrm>
+      </p:grpSpPr>
+      <p:sp>
+        <p:nvSpPr>
+          <p:cNvPr id="2" name="Title 1">
+            <a:extLst>
+              <a:ext uri="{FF2B5EF4-FFF2-40B4-BE49-F238E27FC236}">
+                <a16:creationId xmlns:a16="http://schemas.microsoft.com/office/drawing/2014/main" id="{4E5070A9-CEB7-E71E-614E-BC9386BB20C0}"/>
+              </a:ext>
+            </a:extLst>
+          </p:cNvPr>
+          <p:cNvSpPr>
+            <a:spLocks noGrp="1"/>
+          </p:cNvSpPr>
+          <p:nvPr>
+            <p:ph type="title"/>
+          </p:nvPr>
+        </p:nvSpPr>
+        <p:spPr/>
+        <p:txBody>
+          <a:bodyPr/>
+          <a:lstStyle/>
+          <a:p>
+            <a:r>
+              <a:rPr lang="en-US" dirty="0" err="1"/>
+              <a:t>Thực</a:t>
+            </a:r>
+            <a:r>
+              <a:rPr lang="en-US" dirty="0"/>
+              <a:t> </a:t>
+            </a:r>
+            <a:r>
+              <a:rPr lang="en-US" dirty="0" err="1"/>
+              <a:t>nghiệm</a:t>
+            </a:r>
+            <a:endParaRPr lang="en-US" dirty="0"/>
+          </a:p>
+        </p:txBody>
+      </p:sp>
+      <p:sp>
+        <p:nvSpPr>
+          <p:cNvPr id="4" name="Content Placeholder 3">
+            <a:extLst>
+              <a:ext uri="{FF2B5EF4-FFF2-40B4-BE49-F238E27FC236}">
+                <a16:creationId xmlns:a16="http://schemas.microsoft.com/office/drawing/2014/main" id="{D7E414E4-2C54-2F6C-5AE6-CEB019F933F3}"/>
+              </a:ext>
+            </a:extLst>
+          </p:cNvPr>
+          <p:cNvSpPr>
+            <a:spLocks noGrp="1"/>
+          </p:cNvSpPr>
+          <p:nvPr>
+            <p:ph idx="1"/>
+          </p:nvPr>
+        </p:nvSpPr>
+        <p:spPr>
+          <a:xfrm>
+            <a:off x="1066800" y="1845734"/>
+            <a:ext cx="10058400" cy="4023360"/>
+          </a:xfrm>
+        </p:spPr>
+        <p:txBody>
+          <a:bodyPr/>
+          <a:lstStyle/>
+          <a:p>
+            <a:r>
+              <a:rPr lang="en-US" dirty="0" err="1"/>
+              <a:t>Kết</a:t>
+            </a:r>
+            <a:r>
+              <a:rPr lang="en-US" dirty="0"/>
+              <a:t> </a:t>
+            </a:r>
+            <a:r>
+              <a:rPr lang="en-US" dirty="0" err="1"/>
+              <a:t>quả</a:t>
+            </a:r>
+            <a:r>
+              <a:rPr lang="en-US" dirty="0"/>
+              <a:t> </a:t>
+            </a:r>
+            <a:r>
+              <a:rPr lang="en-US" dirty="0" err="1"/>
+              <a:t>ứng</a:t>
+            </a:r>
+            <a:r>
+              <a:rPr lang="en-US" dirty="0"/>
+              <a:t> </a:t>
+            </a:r>
+            <a:r>
+              <a:rPr lang="en-US" dirty="0" err="1"/>
+              <a:t>với</a:t>
+            </a:r>
+            <a:r>
+              <a:rPr lang="en-US" dirty="0"/>
+              <a:t> </a:t>
+            </a:r>
+            <a:r>
+              <a:rPr lang="en-US" dirty="0" err="1"/>
+              <a:t>bộ</a:t>
+            </a:r>
+            <a:r>
+              <a:rPr lang="en-US" dirty="0"/>
+              <a:t> </a:t>
+            </a:r>
+            <a:r>
+              <a:rPr lang="en-US" dirty="0" err="1"/>
+              <a:t>tham</a:t>
+            </a:r>
+            <a:r>
+              <a:rPr lang="en-US" dirty="0"/>
+              <a:t> số: </a:t>
+            </a:r>
+          </a:p>
+          <a:p>
+            <a:r>
+              <a:rPr lang="en-US" dirty="0"/>
+              <a:t>- Số </a:t>
+            </a:r>
+            <a:r>
+              <a:rPr lang="en-US" dirty="0" err="1"/>
+              <a:t>lượng</a:t>
+            </a:r>
+            <a:r>
+              <a:rPr lang="en-US" dirty="0"/>
+              <a:t> </a:t>
+            </a:r>
+            <a:r>
+              <a:rPr lang="en-US" dirty="0" err="1"/>
+              <a:t>thế</a:t>
+            </a:r>
+            <a:r>
+              <a:rPr lang="en-US" dirty="0"/>
+              <a:t> </a:t>
+            </a:r>
+            <a:r>
+              <a:rPr lang="en-US" dirty="0" err="1"/>
+              <a:t>hệ</a:t>
+            </a:r>
+            <a:r>
+              <a:rPr lang="en-US" dirty="0"/>
+              <a:t>: 500</a:t>
+            </a:r>
+          </a:p>
+          <a:p>
+            <a:r>
+              <a:rPr lang="en-US" dirty="0"/>
+              <a:t>- </a:t>
+            </a:r>
+            <a:r>
+              <a:rPr lang="en-US" dirty="0" err="1"/>
+              <a:t>Kích</a:t>
+            </a:r>
+            <a:r>
+              <a:rPr lang="en-US" dirty="0"/>
+              <a:t> </a:t>
+            </a:r>
+            <a:r>
+              <a:rPr lang="en-US" dirty="0" err="1"/>
+              <a:t>thước</a:t>
+            </a:r>
+            <a:r>
+              <a:rPr lang="en-US" dirty="0"/>
+              <a:t> </a:t>
+            </a:r>
+            <a:r>
+              <a:rPr lang="en-US" dirty="0" err="1"/>
+              <a:t>quần</a:t>
+            </a:r>
+            <a:r>
+              <a:rPr lang="en-US" dirty="0"/>
+              <a:t> </a:t>
+            </a:r>
+            <a:r>
+              <a:rPr lang="en-US" dirty="0" err="1"/>
+              <a:t>thể</a:t>
+            </a:r>
+            <a:r>
+              <a:rPr lang="en-US" dirty="0"/>
+              <a:t>: 5000</a:t>
+            </a:r>
+          </a:p>
+          <a:p>
+            <a:r>
+              <a:rPr lang="en-US" dirty="0"/>
+              <a:t>- </a:t>
+            </a:r>
+            <a:r>
+              <a:rPr lang="en-US" dirty="0" err="1"/>
+              <a:t>Tỷ</a:t>
+            </a:r>
+            <a:r>
+              <a:rPr lang="en-US" dirty="0"/>
+              <a:t> </a:t>
+            </a:r>
+            <a:r>
+              <a:rPr lang="en-US" dirty="0" err="1"/>
+              <a:t>lệ</a:t>
+            </a:r>
+            <a:r>
+              <a:rPr lang="en-US" dirty="0"/>
+              <a:t> </a:t>
+            </a:r>
+            <a:r>
+              <a:rPr lang="en-US" dirty="0" err="1"/>
+              <a:t>đột</a:t>
+            </a:r>
+            <a:r>
+              <a:rPr lang="en-US" dirty="0"/>
+              <a:t> </a:t>
+            </a:r>
+            <a:r>
+              <a:rPr lang="en-US" dirty="0" err="1"/>
+              <a:t>biến</a:t>
+            </a:r>
+            <a:r>
+              <a:rPr lang="en-US" dirty="0"/>
+              <a:t>: 0.1</a:t>
+            </a:r>
+          </a:p>
+          <a:p>
+            <a:r>
+              <a:rPr lang="en-US" dirty="0"/>
+              <a:t>- </a:t>
+            </a:r>
+            <a:r>
+              <a:rPr lang="en-US" dirty="0" err="1"/>
+              <a:t>Kích</a:t>
+            </a:r>
+            <a:r>
+              <a:rPr lang="en-US" dirty="0"/>
+              <a:t> </a:t>
+            </a:r>
+            <a:r>
+              <a:rPr lang="en-US" dirty="0" err="1"/>
+              <a:t>thước</a:t>
+            </a:r>
+            <a:r>
+              <a:rPr lang="en-US" dirty="0"/>
+              <a:t> tournament: 4</a:t>
+            </a:r>
+          </a:p>
+          <a:p>
+            <a:r>
+              <a:rPr lang="en-US" dirty="0"/>
+              <a:t>=&gt; </a:t>
+            </a:r>
+            <a:r>
+              <a:rPr lang="en-US" dirty="0" err="1"/>
+              <a:t>Kết</a:t>
+            </a:r>
+            <a:r>
+              <a:rPr lang="en-US" dirty="0"/>
+              <a:t> </a:t>
+            </a:r>
+            <a:r>
+              <a:rPr lang="en-US" dirty="0" err="1"/>
+              <a:t>quả</a:t>
+            </a:r>
+            <a:r>
+              <a:rPr lang="en-US" dirty="0"/>
+              <a:t>: 10641.26</a:t>
+            </a:r>
+          </a:p>
+          <a:p>
+            <a:endParaRPr lang="en-US" dirty="0"/>
+          </a:p>
+        </p:txBody>
+      </p:sp>
+      <p:pic>
+        <p:nvPicPr>
+          <p:cNvPr id="5" name="Picture 4">
+            <a:extLst>
+              <a:ext uri="{FF2B5EF4-FFF2-40B4-BE49-F238E27FC236}">
+                <a16:creationId xmlns:a16="http://schemas.microsoft.com/office/drawing/2014/main" id="{BC26E152-A151-B320-BA04-7D6B7B56DD12}"/>
+              </a:ext>
+            </a:extLst>
+          </p:cNvPr>
+          <p:cNvPicPr>
+            <a:picLocks noChangeAspect="1"/>
+          </p:cNvPicPr>
+          <p:nvPr/>
+        </p:nvPicPr>
+        <p:blipFill>
+          <a:blip r:embed="rId2"/>
+          <a:stretch>
+            <a:fillRect/>
+          </a:stretch>
+        </p:blipFill>
+        <p:spPr>
+          <a:xfrm>
+            <a:off x="5853848" y="1737360"/>
+            <a:ext cx="5852172" cy="4389129"/>
+          </a:xfrm>
+          <a:prstGeom prst="rect">
+            <a:avLst/>
+          </a:prstGeom>
+        </p:spPr>
+      </p:pic>
+    </p:spTree>
+    <p:extLst>
+      <p:ext uri="{BB962C8B-B14F-4D97-AF65-F5344CB8AC3E}">
+        <p14:creationId xmlns:p14="http://schemas.microsoft.com/office/powerpoint/2010/main" val="2622766114"/>
+      </p:ext>
+    </p:extLst>
+  </p:cSld>
+  <p:clrMapOvr>
+    <a:masterClrMapping/>
+  </p:clrMapOvr>
+</p:sld>
+</file>
+
+<file path=ppt/slides/slide9.xml><?xml version="1.0" encoding="utf-8"?>
+<p:sld xmlns:a="http://schemas.openxmlformats.org/drawingml/2006/main" xmlns:r="http://schemas.openxmlformats.org/officeDocument/2006/relationships" xmlns:p="http://schemas.openxmlformats.org/presentationml/2006/main">
+  <p:cSld>
+    <p:spTree>
+      <p:nvGrpSpPr>
+        <p:cNvPr id="1" name=""/>
+        <p:cNvGrpSpPr/>
+        <p:nvPr/>
+      </p:nvGrpSpPr>
+      <p:grpSpPr>
+        <a:xfrm>
+          <a:off x="0" y="0"/>
+          <a:ext cx="0" cy="0"/>
+          <a:chOff x="0" y="0"/>
+          <a:chExt cx="0" cy="0"/>
+        </a:xfrm>
+      </p:grpSpPr>
+      <p:sp>
+        <p:nvSpPr>
+          <p:cNvPr id="2" name="Title 1">
+            <a:extLst>
+              <a:ext uri="{FF2B5EF4-FFF2-40B4-BE49-F238E27FC236}">
+                <a16:creationId xmlns:a16="http://schemas.microsoft.com/office/drawing/2014/main" id="{4E5070A9-CEB7-E71E-614E-BC9386BB20C0}"/>
+              </a:ext>
+            </a:extLst>
+          </p:cNvPr>
+          <p:cNvSpPr>
+            <a:spLocks noGrp="1"/>
+          </p:cNvSpPr>
+          <p:nvPr>
+            <p:ph type="title"/>
+          </p:nvPr>
+        </p:nvSpPr>
+        <p:spPr/>
+        <p:txBody>
+          <a:bodyPr/>
+          <a:lstStyle/>
+          <a:p>
+            <a:r>
+              <a:rPr lang="en-US" dirty="0" err="1"/>
               <a:t>Đánh</a:t>
             </a:r>
             <a:r>
@@ -6903,74 +7913,358 @@
           <a:p>
             <a:r>
               <a:rPr lang="en-US" sz="1800" dirty="0"/>
-              <a:t>1. </a:t>
-            </a:r>
-            <a:r>
-              <a:rPr lang="en-US" sz="1800" dirty="0" err="1"/>
-              <a:t>Độ</a:t>
-            </a:r>
-            <a:r>
-              <a:rPr lang="en-US" sz="1800" dirty="0"/>
-              <a:t> </a:t>
-            </a:r>
-            <a:r>
-              <a:rPr lang="en-US" sz="1800" dirty="0" err="1"/>
-              <a:t>phức</a:t>
-            </a:r>
-            <a:r>
-              <a:rPr lang="en-US" sz="1800" dirty="0"/>
-              <a:t> </a:t>
-            </a:r>
-            <a:r>
-              <a:rPr lang="en-US" sz="1800" dirty="0" err="1"/>
-              <a:t>tạp</a:t>
+              <a:t>- </a:t>
+            </a:r>
+            <a:r>
+              <a:rPr lang="en-US" sz="1800" dirty="0" err="1"/>
+              <a:t>Thuật</a:t>
+            </a:r>
+            <a:r>
+              <a:rPr lang="en-US" sz="1800" dirty="0"/>
+              <a:t> </a:t>
+            </a:r>
+            <a:r>
+              <a:rPr lang="en-US" sz="1800" dirty="0" err="1"/>
+              <a:t>toán</a:t>
+            </a:r>
+            <a:r>
+              <a:rPr lang="en-US" sz="1800" dirty="0"/>
+              <a:t> di </a:t>
+            </a:r>
+            <a:r>
+              <a:rPr lang="en-US" sz="1800" dirty="0" err="1"/>
+              <a:t>truyền</a:t>
+            </a:r>
+            <a:r>
+              <a:rPr lang="en-US" sz="1800" dirty="0"/>
+              <a:t> </a:t>
+            </a:r>
+            <a:r>
+              <a:rPr lang="en-US" sz="1800" dirty="0" err="1"/>
+              <a:t>không</a:t>
+            </a:r>
+            <a:r>
+              <a:rPr lang="en-US" sz="1800" dirty="0"/>
+              <a:t> </a:t>
+            </a:r>
+            <a:r>
+              <a:rPr lang="en-US" sz="1800" dirty="0" err="1"/>
+              <a:t>cho</a:t>
+            </a:r>
+            <a:r>
+              <a:rPr lang="en-US" sz="1800" dirty="0"/>
+              <a:t> </a:t>
+            </a:r>
+            <a:r>
+              <a:rPr lang="en-US" sz="1800" dirty="0" err="1"/>
+              <a:t>lời</a:t>
+            </a:r>
+            <a:r>
+              <a:rPr lang="en-US" sz="1800" dirty="0"/>
+              <a:t> giải </a:t>
+            </a:r>
+            <a:r>
+              <a:rPr lang="en-US" sz="1800" dirty="0" err="1"/>
+              <a:t>tối</a:t>
+            </a:r>
+            <a:r>
+              <a:rPr lang="en-US" sz="1800" dirty="0"/>
+              <a:t> </a:t>
+            </a:r>
+            <a:r>
+              <a:rPr lang="en-US" sz="1800" dirty="0" err="1"/>
+              <a:t>ưu</a:t>
+            </a:r>
+            <a:r>
+              <a:rPr lang="en-US" sz="1800" dirty="0"/>
+              <a:t> </a:t>
+            </a:r>
+            <a:r>
+              <a:rPr lang="en-US" sz="1800" dirty="0" err="1"/>
+              <a:t>nhất</a:t>
+            </a:r>
+            <a:r>
+              <a:rPr lang="en-US" sz="1800" dirty="0"/>
+              <a:t> nhưng có </a:t>
+            </a:r>
+            <a:r>
+              <a:rPr lang="en-US" sz="1800" dirty="0" err="1"/>
+              <a:t>thể</a:t>
+            </a:r>
+            <a:r>
+              <a:rPr lang="en-US" sz="1800" dirty="0"/>
+              <a:t> </a:t>
+            </a:r>
+            <a:r>
+              <a:rPr lang="en-US" sz="1800" dirty="0" err="1"/>
+              <a:t>cho</a:t>
+            </a:r>
+            <a:r>
+              <a:rPr lang="en-US" sz="1800" dirty="0"/>
+              <a:t> </a:t>
+            </a:r>
+            <a:r>
+              <a:rPr lang="en-US" sz="1800" dirty="0" err="1"/>
+              <a:t>lời</a:t>
+            </a:r>
+            <a:r>
+              <a:rPr lang="en-US" sz="1800" dirty="0"/>
+              <a:t> giải </a:t>
+            </a:r>
+            <a:r>
+              <a:rPr lang="en-US" sz="1800" dirty="0" err="1"/>
+              <a:t>đủ</a:t>
+            </a:r>
+            <a:r>
+              <a:rPr lang="en-US" sz="1800" dirty="0"/>
+              <a:t> </a:t>
+            </a:r>
+            <a:r>
+              <a:rPr lang="en-US" sz="1800" dirty="0" err="1"/>
+              <a:t>tốt</a:t>
+            </a:r>
+            <a:r>
+              <a:rPr lang="en-US" sz="1800" dirty="0"/>
+              <a:t> </a:t>
+            </a:r>
+            <a:r>
+              <a:rPr lang="en-US" sz="1800" dirty="0" err="1"/>
+              <a:t>với</a:t>
+            </a:r>
+            <a:r>
+              <a:rPr lang="en-US" sz="1800" dirty="0"/>
+              <a:t> </a:t>
+            </a:r>
+            <a:r>
+              <a:rPr lang="en-US" sz="1800" dirty="0" err="1"/>
+              <a:t>bộ</a:t>
+            </a:r>
+            <a:r>
+              <a:rPr lang="en-US" sz="1800" dirty="0"/>
+              <a:t> </a:t>
+            </a:r>
+            <a:r>
+              <a:rPr lang="en-US" sz="1800" dirty="0" err="1"/>
+              <a:t>tham</a:t>
+            </a:r>
+            <a:r>
+              <a:rPr lang="en-US" sz="1800" dirty="0"/>
+              <a:t> số </a:t>
+            </a:r>
+            <a:r>
+              <a:rPr lang="en-US" sz="1800" dirty="0" err="1"/>
+              <a:t>phù</a:t>
+            </a:r>
+            <a:r>
+              <a:rPr lang="en-US" sz="1800" dirty="0"/>
+              <a:t> </a:t>
+            </a:r>
+            <a:r>
+              <a:rPr lang="en-US" sz="1800" dirty="0" err="1"/>
+              <a:t>hợp</a:t>
             </a:r>
             <a:endParaRPr lang="en-US" sz="1800" dirty="0"/>
           </a:p>
           <a:p>
             <a:r>
               <a:rPr lang="en-US" sz="1800" dirty="0"/>
-              <a:t>- Time complexity: O(n</a:t>
-            </a:r>
-            <a:r>
-              <a:rPr lang="en-US" sz="1800" baseline="30000" dirty="0"/>
-              <a:t>2</a:t>
-            </a:r>
-            <a:r>
-              <a:rPr lang="en-US" sz="1800" dirty="0"/>
-              <a:t>)</a:t>
-            </a:r>
-          </a:p>
-          <a:p>
-            <a:r>
-              <a:rPr lang="en-US" sz="1800" dirty="0"/>
-              <a:t>- Space complexity: O(n)</a:t>
-            </a:r>
-          </a:p>
-          <a:p>
-            <a:r>
-              <a:rPr lang="en-US" sz="1800" dirty="0"/>
-              <a:t>2. </a:t>
-            </a:r>
-            <a:r>
-              <a:rPr lang="en-US" sz="1800" dirty="0" err="1"/>
-              <a:t>Kết</a:t>
-            </a:r>
-            <a:r>
-              <a:rPr lang="en-US" sz="1800" dirty="0"/>
-              <a:t> </a:t>
-            </a:r>
-            <a:r>
-              <a:rPr lang="en-US" sz="1800" dirty="0" err="1"/>
-              <a:t>luận</a:t>
-            </a:r>
-            <a:r>
-              <a:rPr lang="en-US" sz="1800" dirty="0"/>
-              <a:t>: </a:t>
-            </a:r>
-            <a:r>
-              <a:rPr lang="en-US" sz="1800" dirty="0" err="1"/>
-              <a:t>Thuật</a:t>
+              <a:t>- </a:t>
+            </a:r>
+            <a:r>
+              <a:rPr lang="en-US" sz="1800" dirty="0" err="1"/>
+              <a:t>Chọn</a:t>
+            </a:r>
+            <a:r>
+              <a:rPr lang="en-US" sz="1800" dirty="0"/>
+              <a:t> </a:t>
+            </a:r>
+            <a:r>
+              <a:rPr lang="en-US" sz="1800" dirty="0" err="1"/>
+              <a:t>các</a:t>
+            </a:r>
+            <a:r>
+              <a:rPr lang="en-US" sz="1800" dirty="0"/>
+              <a:t> </a:t>
+            </a:r>
+            <a:r>
+              <a:rPr lang="en-US" sz="1800" dirty="0" err="1"/>
+              <a:t>tham</a:t>
+            </a:r>
+            <a:r>
+              <a:rPr lang="en-US" sz="1800" dirty="0"/>
+              <a:t> số </a:t>
+            </a:r>
+            <a:r>
+              <a:rPr lang="en-US" sz="1800" dirty="0" err="1"/>
+              <a:t>như</a:t>
+            </a:r>
+            <a:r>
+              <a:rPr lang="en-US" sz="1800" dirty="0"/>
+              <a:t> </a:t>
+            </a:r>
+            <a:r>
+              <a:rPr lang="en-US" sz="1800" dirty="0" err="1"/>
+              <a:t>kích</a:t>
+            </a:r>
+            <a:r>
+              <a:rPr lang="en-US" sz="1800" dirty="0"/>
+              <a:t> </a:t>
+            </a:r>
+            <a:r>
+              <a:rPr lang="en-US" sz="1800" dirty="0" err="1"/>
+              <a:t>thước</a:t>
+            </a:r>
+            <a:r>
+              <a:rPr lang="en-US" sz="1800" dirty="0"/>
+              <a:t> </a:t>
+            </a:r>
+            <a:r>
+              <a:rPr lang="en-US" sz="1800" dirty="0" err="1"/>
+              <a:t>quần</a:t>
+            </a:r>
+            <a:r>
+              <a:rPr lang="en-US" sz="1800" dirty="0"/>
+              <a:t> </a:t>
+            </a:r>
+            <a:r>
+              <a:rPr lang="en-US" sz="1800" dirty="0" err="1"/>
+              <a:t>thể</a:t>
+            </a:r>
+            <a:r>
+              <a:rPr lang="en-US" sz="1800" dirty="0"/>
+              <a:t>, số </a:t>
+            </a:r>
+            <a:r>
+              <a:rPr lang="en-US" sz="1800" dirty="0" err="1"/>
+              <a:t>lượng</a:t>
+            </a:r>
+            <a:r>
+              <a:rPr lang="en-US" sz="1800" dirty="0"/>
+              <a:t> </a:t>
+            </a:r>
+            <a:r>
+              <a:rPr lang="en-US" sz="1800" dirty="0" err="1"/>
+              <a:t>thế</a:t>
+            </a:r>
+            <a:r>
+              <a:rPr lang="en-US" sz="1800" dirty="0"/>
+              <a:t> </a:t>
+            </a:r>
+            <a:r>
+              <a:rPr lang="en-US" sz="1800" dirty="0" err="1"/>
+              <a:t>hệ</a:t>
+            </a:r>
+            <a:r>
+              <a:rPr lang="en-US" sz="1800" dirty="0"/>
+              <a:t> </a:t>
+            </a:r>
+            <a:r>
+              <a:rPr lang="en-US" sz="1800" dirty="0" err="1"/>
+              <a:t>càng</a:t>
+            </a:r>
+            <a:r>
+              <a:rPr lang="en-US" sz="1800" dirty="0"/>
+              <a:t> </a:t>
+            </a:r>
+            <a:r>
+              <a:rPr lang="en-US" sz="1800" dirty="0" err="1"/>
+              <a:t>lớn</a:t>
+            </a:r>
+            <a:r>
+              <a:rPr lang="en-US" sz="1800" dirty="0"/>
+              <a:t> thì </a:t>
+            </a:r>
+            <a:r>
+              <a:rPr lang="en-US" sz="1800" dirty="0" err="1"/>
+              <a:t>lời</a:t>
+            </a:r>
+            <a:r>
+              <a:rPr lang="en-US" sz="1800" dirty="0"/>
+              <a:t> giải </a:t>
+            </a:r>
+            <a:r>
+              <a:rPr lang="en-US" sz="1800" dirty="0" err="1"/>
+              <a:t>đưa</a:t>
+            </a:r>
+            <a:r>
+              <a:rPr lang="en-US" sz="1800" dirty="0"/>
+              <a:t> </a:t>
+            </a:r>
+            <a:r>
+              <a:rPr lang="en-US" sz="1800" dirty="0" err="1"/>
+              <a:t>ra</a:t>
+            </a:r>
+            <a:r>
+              <a:rPr lang="en-US" sz="1800" dirty="0"/>
+              <a:t> </a:t>
+            </a:r>
+            <a:r>
+              <a:rPr lang="en-US" sz="1800" dirty="0" err="1"/>
+              <a:t>sẽ</a:t>
+            </a:r>
+            <a:r>
+              <a:rPr lang="en-US" sz="1800" dirty="0"/>
+              <a:t> </a:t>
+            </a:r>
+            <a:r>
+              <a:rPr lang="en-US" sz="1800" dirty="0" err="1"/>
+              <a:t>càng</a:t>
+            </a:r>
+            <a:r>
+              <a:rPr lang="en-US" sz="1800" dirty="0"/>
+              <a:t> </a:t>
+            </a:r>
+            <a:r>
+              <a:rPr lang="en-US" sz="1800" dirty="0" err="1"/>
+              <a:t>chính</a:t>
+            </a:r>
+            <a:r>
+              <a:rPr lang="en-US" sz="1800" dirty="0"/>
+              <a:t> </a:t>
+            </a:r>
+            <a:r>
+              <a:rPr lang="en-US" sz="1800" dirty="0" err="1"/>
+              <a:t>xác</a:t>
+            </a:r>
+            <a:r>
+              <a:rPr lang="en-US" sz="1800" dirty="0"/>
+              <a:t>, nhưng </a:t>
+            </a:r>
+            <a:r>
+              <a:rPr lang="en-US" sz="1800" dirty="0" err="1"/>
+              <a:t>đổi</a:t>
+            </a:r>
+            <a:r>
+              <a:rPr lang="en-US" sz="1800" dirty="0"/>
+              <a:t> </a:t>
+            </a:r>
+            <a:r>
+              <a:rPr lang="en-US" sz="1800" dirty="0" err="1"/>
+              <a:t>lại</a:t>
+            </a:r>
+            <a:r>
+              <a:rPr lang="en-US" sz="1800" dirty="0"/>
+              <a:t> </a:t>
+            </a:r>
+            <a:r>
+              <a:rPr lang="en-US" sz="1800" dirty="0" err="1"/>
+              <a:t>thời</a:t>
+            </a:r>
+            <a:r>
+              <a:rPr lang="en-US" sz="1800" dirty="0"/>
+              <a:t> </a:t>
+            </a:r>
+            <a:r>
+              <a:rPr lang="en-US" sz="1800" dirty="0" err="1"/>
+              <a:t>gian</a:t>
+            </a:r>
+            <a:r>
+              <a:rPr lang="en-US" sz="1800" dirty="0"/>
+              <a:t> </a:t>
+            </a:r>
+            <a:r>
+              <a:rPr lang="en-US" sz="1800" dirty="0" err="1"/>
+              <a:t>thuật</a:t>
             </a:r>
             <a:r>
               <a:rPr lang="en-US" sz="1800" dirty="0"/>
@@ -6982,203 +8276,19 @@
             </a:r>
             <a:r>
               <a:rPr lang="en-US" sz="1800" dirty="0"/>
-              <a:t> di </a:t>
-            </a:r>
-            <a:r>
-              <a:rPr lang="en-US" sz="1800" dirty="0" err="1"/>
-              <a:t>truyền</a:t>
-            </a:r>
-            <a:r>
-              <a:rPr lang="en-US" sz="1800" dirty="0"/>
-              <a:t> có </a:t>
-            </a:r>
-            <a:r>
-              <a:rPr lang="en-US" sz="1800" dirty="0" err="1"/>
-              <a:t>thể</a:t>
-            </a:r>
-            <a:r>
-              <a:rPr lang="en-US" sz="1800" dirty="0"/>
-              <a:t> </a:t>
-            </a:r>
-            <a:r>
-              <a:rPr lang="en-US" sz="1800" dirty="0" err="1"/>
-              <a:t>sử</a:t>
-            </a:r>
-            <a:r>
-              <a:rPr lang="en-US" sz="1800" dirty="0"/>
-              <a:t> </a:t>
-            </a:r>
-            <a:r>
-              <a:rPr lang="en-US" sz="1800" dirty="0" err="1"/>
-              <a:t>dụng</a:t>
-            </a:r>
-            <a:r>
-              <a:rPr lang="en-US" sz="1800" dirty="0"/>
-              <a:t> </a:t>
-            </a:r>
-            <a:r>
-              <a:rPr lang="en-US" sz="1800" dirty="0" err="1"/>
-              <a:t>để</a:t>
-            </a:r>
-            <a:r>
-              <a:rPr lang="en-US" sz="1800" dirty="0"/>
-              <a:t> giải bài </a:t>
-            </a:r>
-            <a:r>
-              <a:rPr lang="en-US" sz="1800" dirty="0" err="1"/>
-              <a:t>toán</a:t>
-            </a:r>
-            <a:r>
-              <a:rPr lang="en-US" sz="1800" dirty="0"/>
-              <a:t> TSP </a:t>
-            </a:r>
-            <a:r>
-              <a:rPr lang="en-US" sz="1800" dirty="0" err="1"/>
-              <a:t>cùng</a:t>
-            </a:r>
-            <a:r>
-              <a:rPr lang="en-US" sz="1800" dirty="0"/>
-              <a:t> </a:t>
-            </a:r>
-            <a:r>
-              <a:rPr lang="en-US" sz="1800" dirty="0" err="1"/>
-              <a:t>với</a:t>
-            </a:r>
-            <a:r>
-              <a:rPr lang="en-US" sz="1800" dirty="0"/>
-              <a:t> </a:t>
-            </a:r>
-            <a:r>
-              <a:rPr lang="en-US" sz="1800" dirty="0" err="1"/>
-              <a:t>nhiều</a:t>
-            </a:r>
-            <a:r>
-              <a:rPr lang="en-US" sz="1800" dirty="0"/>
-              <a:t> bài </a:t>
-            </a:r>
-            <a:r>
-              <a:rPr lang="en-US" sz="1800" dirty="0" err="1"/>
-              <a:t>toán</a:t>
-            </a:r>
-            <a:r>
-              <a:rPr lang="en-US" sz="1800" dirty="0"/>
-              <a:t> </a:t>
-            </a:r>
-            <a:r>
-              <a:rPr lang="en-US" sz="1800" dirty="0" err="1"/>
-              <a:t>tối</a:t>
-            </a:r>
-            <a:r>
-              <a:rPr lang="en-US" sz="1800" dirty="0"/>
-              <a:t> </a:t>
-            </a:r>
-            <a:r>
-              <a:rPr lang="en-US" sz="1800" dirty="0" err="1"/>
-              <a:t>ưu</a:t>
-            </a:r>
-            <a:r>
-              <a:rPr lang="en-US" sz="1800" dirty="0"/>
-              <a:t> </a:t>
-            </a:r>
-            <a:r>
-              <a:rPr lang="en-US" sz="1800" dirty="0" err="1"/>
-              <a:t>tổ</a:t>
-            </a:r>
-            <a:r>
-              <a:rPr lang="en-US" sz="1800" dirty="0"/>
-              <a:t> </a:t>
-            </a:r>
-            <a:r>
-              <a:rPr lang="en-US" sz="1800" dirty="0" err="1"/>
-              <a:t>hợp</a:t>
-            </a:r>
-            <a:r>
-              <a:rPr lang="en-US" sz="1800" dirty="0"/>
-              <a:t> </a:t>
-            </a:r>
-            <a:r>
-              <a:rPr lang="en-US" sz="1800" dirty="0" err="1"/>
-              <a:t>khác</a:t>
-            </a:r>
-            <a:r>
-              <a:rPr lang="en-US" sz="1800" dirty="0"/>
-              <a:t>. </a:t>
-            </a:r>
-            <a:r>
-              <a:rPr lang="en-US" sz="1800" dirty="0" err="1"/>
-              <a:t>Thuật</a:t>
-            </a:r>
-            <a:r>
-              <a:rPr lang="en-US" sz="1800" dirty="0"/>
-              <a:t> </a:t>
-            </a:r>
-            <a:r>
-              <a:rPr lang="en-US" sz="1800" dirty="0" err="1"/>
-              <a:t>toán</a:t>
-            </a:r>
-            <a:r>
-              <a:rPr lang="en-US" sz="1800" dirty="0"/>
-              <a:t> di </a:t>
-            </a:r>
-            <a:r>
-              <a:rPr lang="en-US" sz="1800" dirty="0" err="1"/>
-              <a:t>truyền</a:t>
-            </a:r>
-            <a:r>
-              <a:rPr lang="en-US" sz="1800" dirty="0"/>
-              <a:t> </a:t>
-            </a:r>
-            <a:r>
-              <a:rPr lang="en-US" sz="1800" dirty="0" err="1"/>
-              <a:t>lặp</a:t>
-            </a:r>
-            <a:r>
-              <a:rPr lang="en-US" sz="1800" dirty="0"/>
-              <a:t> đi </a:t>
-            </a:r>
-            <a:r>
-              <a:rPr lang="en-US" sz="1800" dirty="0" err="1"/>
-              <a:t>lặp</a:t>
-            </a:r>
-            <a:r>
-              <a:rPr lang="en-US" sz="1800" dirty="0"/>
-              <a:t> </a:t>
-            </a:r>
-            <a:r>
-              <a:rPr lang="en-US" sz="1800" dirty="0" err="1"/>
-              <a:t>lại</a:t>
-            </a:r>
-            <a:r>
-              <a:rPr lang="en-US" sz="1800" dirty="0"/>
-              <a:t> </a:t>
-            </a:r>
-            <a:r>
-              <a:rPr lang="en-US" sz="1800" dirty="0" err="1"/>
-              <a:t>việc</a:t>
-            </a:r>
-            <a:r>
-              <a:rPr lang="en-US" sz="1800" dirty="0"/>
-              <a:t> tìm </a:t>
-            </a:r>
-            <a:r>
-              <a:rPr lang="en-US" sz="1800" dirty="0" err="1"/>
-              <a:t>kiếm</a:t>
-            </a:r>
-            <a:r>
-              <a:rPr lang="en-US" sz="1800" dirty="0"/>
-              <a:t> </a:t>
-            </a:r>
-            <a:r>
-              <a:rPr lang="en-US" sz="1800" dirty="0" err="1"/>
-              <a:t>không</a:t>
-            </a:r>
-            <a:r>
-              <a:rPr lang="en-US" sz="1800" dirty="0"/>
-              <a:t> </a:t>
-            </a:r>
-            <a:r>
-              <a:rPr lang="en-US" sz="1800" dirty="0" err="1"/>
-              <a:t>gian</a:t>
+              <a:t> </a:t>
+            </a:r>
+            <a:r>
+              <a:rPr lang="en-US" sz="1800" dirty="0" err="1"/>
+              <a:t>đưa</a:t>
+            </a:r>
+            <a:r>
+              <a:rPr lang="en-US" sz="1800" dirty="0"/>
+              <a:t> </a:t>
+            </a:r>
+            <a:r>
+              <a:rPr lang="en-US" sz="1800" dirty="0" err="1"/>
+              <a:t>ra</a:t>
             </a:r>
             <a:r>
               <a:rPr lang="en-US" sz="1800" dirty="0"/>
@@ -7194,127 +8304,15 @@
             </a:r>
             <a:r>
               <a:rPr lang="en-US" sz="1800" dirty="0" err="1"/>
-              <a:t>khả</a:t>
-            </a:r>
-            <a:r>
-              <a:rPr lang="en-US" sz="1800" dirty="0"/>
-              <a:t> </a:t>
-            </a:r>
-            <a:r>
-              <a:rPr lang="en-US" sz="1800" dirty="0" err="1"/>
-              <a:t>thi</a:t>
-            </a:r>
-            <a:r>
-              <a:rPr lang="en-US" sz="1800" dirty="0"/>
-              <a:t> (</a:t>
-            </a:r>
-            <a:r>
-              <a:rPr lang="en-US" sz="1800" dirty="0" err="1"/>
-              <a:t>quần</a:t>
-            </a:r>
-            <a:r>
-              <a:rPr lang="en-US" sz="1800" dirty="0"/>
-              <a:t> </a:t>
-            </a:r>
-            <a:r>
-              <a:rPr lang="en-US" sz="1800" dirty="0" err="1"/>
-              <a:t>thể</a:t>
-            </a:r>
-            <a:r>
-              <a:rPr lang="en-US" sz="1800" dirty="0"/>
-              <a:t>), </a:t>
-            </a:r>
-            <a:r>
-              <a:rPr lang="en-US" sz="1800" dirty="0" err="1"/>
-              <a:t>cải</a:t>
-            </a:r>
-            <a:r>
-              <a:rPr lang="en-US" sz="1800" dirty="0"/>
-              <a:t> </a:t>
-            </a:r>
-            <a:r>
-              <a:rPr lang="en-US" sz="1800" dirty="0" err="1"/>
-              <a:t>thiện</a:t>
-            </a:r>
-            <a:r>
-              <a:rPr lang="en-US" sz="1800" dirty="0"/>
-              <a:t> </a:t>
-            </a:r>
-            <a:r>
-              <a:rPr lang="en-US" sz="1800" dirty="0" err="1"/>
-              <a:t>độ</a:t>
-            </a:r>
-            <a:r>
-              <a:rPr lang="en-US" sz="1800" dirty="0"/>
-              <a:t> </a:t>
-            </a:r>
-            <a:r>
-              <a:rPr lang="en-US" sz="1800" dirty="0" err="1"/>
-              <a:t>dài</a:t>
-            </a:r>
-            <a:r>
-              <a:rPr lang="en-US" sz="1800" dirty="0"/>
-              <a:t> </a:t>
-            </a:r>
-            <a:r>
-              <a:rPr lang="en-US" sz="1800" dirty="0" err="1"/>
-              <a:t>đường</a:t>
-            </a:r>
-            <a:r>
-              <a:rPr lang="en-US" sz="1800" dirty="0"/>
-              <a:t> đi (</a:t>
-            </a:r>
-            <a:r>
-              <a:rPr lang="en-US" sz="1800" dirty="0" err="1"/>
-              <a:t>cá</a:t>
-            </a:r>
-            <a:r>
-              <a:rPr lang="en-US" sz="1800" dirty="0"/>
-              <a:t> </a:t>
-            </a:r>
-            <a:r>
-              <a:rPr lang="en-US" sz="1800" dirty="0" err="1"/>
-              <a:t>thể</a:t>
-            </a:r>
-            <a:r>
-              <a:rPr lang="en-US" sz="1800" dirty="0"/>
-              <a:t>) </a:t>
-            </a:r>
-            <a:r>
-              <a:rPr lang="en-US" sz="1800" dirty="0" err="1"/>
-              <a:t>để</a:t>
-            </a:r>
-            <a:r>
-              <a:rPr lang="en-US" sz="1800" dirty="0"/>
-              <a:t> </a:t>
-            </a:r>
-            <a:r>
-              <a:rPr lang="en-US" sz="1800" dirty="0" err="1"/>
-              <a:t>đạt</a:t>
-            </a:r>
-            <a:r>
-              <a:rPr lang="en-US" sz="1800" dirty="0"/>
-              <a:t> </a:t>
-            </a:r>
-            <a:r>
-              <a:rPr lang="en-US" sz="1800" dirty="0" err="1"/>
-              <a:t>được</a:t>
-            </a:r>
-            <a:r>
-              <a:rPr lang="en-US" sz="1800" dirty="0"/>
-              <a:t> </a:t>
-            </a:r>
-            <a:r>
-              <a:rPr lang="en-US" sz="1800" dirty="0" err="1"/>
-              <a:t>lời</a:t>
-            </a:r>
-            <a:r>
-              <a:rPr lang="en-US" sz="1800" dirty="0"/>
-              <a:t> giải </a:t>
-            </a:r>
-            <a:r>
-              <a:rPr lang="en-US" sz="1800" dirty="0" err="1"/>
-              <a:t>tốt</a:t>
+              <a:t>sẽ</a:t>
+            </a:r>
+            <a:r>
+              <a:rPr lang="en-US" sz="1800" dirty="0"/>
+              <a:t> </a:t>
+            </a:r>
+            <a:r>
+              <a:rPr lang="en-US" sz="1800" dirty="0" err="1"/>
+              <a:t>lâu</a:t>
             </a:r>
             <a:r>
               <a:rPr lang="en-US" sz="1800" dirty="0"/>
@@ -7323,282 +8321,6 @@
             <a:r>
               <a:rPr lang="en-US" sz="1800" dirty="0" err="1"/>
               <a:t>hơn</a:t>
-            </a:r>
-            <a:r>
-              <a:rPr lang="en-US" sz="1800" dirty="0"/>
-              <a:t> </a:t>
-            </a:r>
-            <a:r>
-              <a:rPr lang="en-US" sz="1800" dirty="0" err="1"/>
-              <a:t>thông</a:t>
-            </a:r>
-            <a:r>
-              <a:rPr lang="en-US" sz="1800" dirty="0"/>
-              <a:t> qua </a:t>
-            </a:r>
-            <a:r>
-              <a:rPr lang="en-US" sz="1800" dirty="0" err="1"/>
-              <a:t>lý</a:t>
-            </a:r>
-            <a:r>
-              <a:rPr lang="en-US" sz="1800" dirty="0"/>
-              <a:t> </a:t>
-            </a:r>
-            <a:r>
-              <a:rPr lang="en-US" sz="1800" dirty="0" err="1"/>
-              <a:t>thuyết</a:t>
-            </a:r>
-            <a:r>
-              <a:rPr lang="en-US" sz="1800" dirty="0"/>
-              <a:t> </a:t>
-            </a:r>
-            <a:r>
-              <a:rPr lang="en-US" sz="1800" dirty="0" err="1"/>
-              <a:t>về</a:t>
-            </a:r>
-            <a:r>
-              <a:rPr lang="en-US" sz="1800" dirty="0"/>
-              <a:t> di </a:t>
-            </a:r>
-            <a:r>
-              <a:rPr lang="en-US" sz="1800" dirty="0" err="1"/>
-              <a:t>truyền</a:t>
-            </a:r>
-            <a:r>
-              <a:rPr lang="en-US" sz="1800" dirty="0"/>
-              <a:t> </a:t>
-            </a:r>
-            <a:r>
-              <a:rPr lang="en-US" sz="1800" dirty="0" err="1"/>
-              <a:t>và</a:t>
-            </a:r>
-            <a:r>
-              <a:rPr lang="en-US" sz="1800" dirty="0"/>
-              <a:t> </a:t>
-            </a:r>
-            <a:r>
-              <a:rPr lang="en-US" sz="1800" dirty="0" err="1"/>
-              <a:t>tiến</a:t>
-            </a:r>
-            <a:r>
-              <a:rPr lang="en-US" sz="1800" dirty="0"/>
-              <a:t> </a:t>
-            </a:r>
-            <a:r>
-              <a:rPr lang="en-US" sz="1800" dirty="0" err="1"/>
-              <a:t>hóa</a:t>
-            </a:r>
-            <a:r>
-              <a:rPr lang="en-US" sz="1800" dirty="0"/>
-              <a:t>. </a:t>
-            </a:r>
-            <a:r>
-              <a:rPr lang="en-US" sz="1800" dirty="0" err="1"/>
-              <a:t>Thuật</a:t>
-            </a:r>
-            <a:r>
-              <a:rPr lang="en-US" sz="1800" dirty="0"/>
-              <a:t> </a:t>
-            </a:r>
-            <a:r>
-              <a:rPr lang="en-US" sz="1800" dirty="0" err="1"/>
-              <a:t>toán</a:t>
-            </a:r>
-            <a:r>
-              <a:rPr lang="en-US" sz="1800" dirty="0"/>
-              <a:t> di </a:t>
-            </a:r>
-            <a:r>
-              <a:rPr lang="en-US" sz="1800" dirty="0" err="1"/>
-              <a:t>truyền</a:t>
-            </a:r>
-            <a:r>
-              <a:rPr lang="en-US" sz="1800" dirty="0"/>
-              <a:t> </a:t>
-            </a:r>
-            <a:r>
-              <a:rPr lang="en-US" sz="1800" dirty="0" err="1"/>
-              <a:t>đưa</a:t>
-            </a:r>
-            <a:r>
-              <a:rPr lang="en-US" sz="1800" dirty="0"/>
-              <a:t> </a:t>
-            </a:r>
-            <a:r>
-              <a:rPr lang="en-US" sz="1800" dirty="0" err="1"/>
-              <a:t>ra</a:t>
-            </a:r>
-            <a:r>
-              <a:rPr lang="en-US" sz="1800" dirty="0"/>
-              <a:t> </a:t>
-            </a:r>
-            <a:r>
-              <a:rPr lang="en-US" sz="1800" dirty="0" err="1"/>
-              <a:t>các</a:t>
-            </a:r>
-            <a:r>
-              <a:rPr lang="en-US" sz="1800" dirty="0"/>
-              <a:t> </a:t>
-            </a:r>
-            <a:r>
-              <a:rPr lang="en-US" sz="1800" dirty="0" err="1"/>
-              <a:t>cá</a:t>
-            </a:r>
-            <a:r>
-              <a:rPr lang="en-US" sz="1800" dirty="0"/>
-              <a:t> </a:t>
-            </a:r>
-            <a:r>
-              <a:rPr lang="en-US" sz="1800" dirty="0" err="1"/>
-              <a:t>thể</a:t>
-            </a:r>
-            <a:r>
-              <a:rPr lang="en-US" sz="1800" dirty="0"/>
-              <a:t> </a:t>
-            </a:r>
-            <a:r>
-              <a:rPr lang="en-US" sz="1800" dirty="0" err="1"/>
-              <a:t>tốt</a:t>
-            </a:r>
-            <a:r>
-              <a:rPr lang="en-US" sz="1800" dirty="0"/>
-              <a:t> </a:t>
-            </a:r>
-            <a:r>
-              <a:rPr lang="en-US" sz="1800" dirty="0" err="1"/>
-              <a:t>hơn</a:t>
-            </a:r>
-            <a:r>
-              <a:rPr lang="en-US" sz="1800" dirty="0"/>
-              <a:t> </a:t>
-            </a:r>
-            <a:r>
-              <a:rPr lang="en-US" sz="1800" dirty="0" err="1"/>
-              <a:t>và</a:t>
-            </a:r>
-            <a:r>
-              <a:rPr lang="en-US" sz="1800" dirty="0"/>
-              <a:t> </a:t>
-            </a:r>
-            <a:r>
-              <a:rPr lang="en-US" sz="1800" dirty="0" err="1"/>
-              <a:t>bảo</a:t>
-            </a:r>
-            <a:r>
-              <a:rPr lang="en-US" sz="1800" dirty="0"/>
-              <a:t> </a:t>
-            </a:r>
-            <a:r>
-              <a:rPr lang="en-US" sz="1800" dirty="0" err="1"/>
-              <a:t>tồn</a:t>
-            </a:r>
-            <a:r>
-              <a:rPr lang="en-US" sz="1800" dirty="0"/>
-              <a:t> </a:t>
-            </a:r>
-            <a:r>
-              <a:rPr lang="en-US" sz="1800" dirty="0" err="1"/>
-              <a:t>sự</a:t>
-            </a:r>
-            <a:r>
-              <a:rPr lang="en-US" sz="1800" dirty="0"/>
-              <a:t> </a:t>
-            </a:r>
-            <a:r>
-              <a:rPr lang="en-US" sz="1800" dirty="0" err="1"/>
-              <a:t>đa</a:t>
-            </a:r>
-            <a:r>
-              <a:rPr lang="en-US" sz="1800" dirty="0"/>
-              <a:t> </a:t>
-            </a:r>
-            <a:r>
-              <a:rPr lang="en-US" sz="1800" dirty="0" err="1"/>
-              <a:t>dạng</a:t>
-            </a:r>
-            <a:r>
-              <a:rPr lang="en-US" sz="1800" dirty="0"/>
-              <a:t> của </a:t>
-            </a:r>
-            <a:r>
-              <a:rPr lang="en-US" sz="1800" dirty="0" err="1"/>
-              <a:t>quần</a:t>
-            </a:r>
-            <a:r>
-              <a:rPr lang="en-US" sz="1800" dirty="0"/>
-              <a:t> </a:t>
-            </a:r>
-            <a:r>
-              <a:rPr lang="en-US" sz="1800" dirty="0" err="1"/>
-              <a:t>thể</a:t>
-            </a:r>
-            <a:r>
-              <a:rPr lang="en-US" sz="1800" dirty="0"/>
-              <a:t> </a:t>
-            </a:r>
-            <a:r>
-              <a:rPr lang="en-US" sz="1800" dirty="0" err="1"/>
-              <a:t>thông</a:t>
-            </a:r>
-            <a:r>
-              <a:rPr lang="en-US" sz="1800" dirty="0"/>
-              <a:t> qua </a:t>
-            </a:r>
-            <a:r>
-              <a:rPr lang="en-US" sz="1800" dirty="0" err="1"/>
-              <a:t>chọn</a:t>
-            </a:r>
-            <a:r>
-              <a:rPr lang="en-US" sz="1800" dirty="0"/>
-              <a:t> </a:t>
-            </a:r>
-            <a:r>
-              <a:rPr lang="en-US" sz="1800" dirty="0" err="1"/>
-              <a:t>lọc</a:t>
-            </a:r>
-            <a:r>
-              <a:rPr lang="en-US" sz="1800" dirty="0"/>
-              <a:t>, </a:t>
-            </a:r>
-            <a:r>
-              <a:rPr lang="en-US" sz="1800" dirty="0" err="1"/>
-              <a:t>lai</a:t>
-            </a:r>
-            <a:r>
-              <a:rPr lang="en-US" sz="1800" dirty="0"/>
-              <a:t> </a:t>
-            </a:r>
-            <a:r>
-              <a:rPr lang="en-US" sz="1800" dirty="0" err="1"/>
-              <a:t>ghép</a:t>
-            </a:r>
-            <a:r>
-              <a:rPr lang="en-US" sz="1800" dirty="0"/>
-              <a:t> </a:t>
-            </a:r>
-            <a:r>
-              <a:rPr lang="en-US" sz="1800" dirty="0" err="1"/>
-              <a:t>và</a:t>
-            </a:r>
-            <a:r>
-              <a:rPr lang="en-US" sz="1800" dirty="0"/>
-              <a:t> </a:t>
-            </a:r>
-            <a:r>
-              <a:rPr lang="en-US" sz="1800" dirty="0" err="1"/>
-              <a:t>đột</a:t>
-            </a:r>
-            <a:r>
-              <a:rPr lang="en-US" sz="1800" dirty="0"/>
-              <a:t> </a:t>
-            </a:r>
-            <a:r>
-              <a:rPr lang="en-US" sz="1800" dirty="0" err="1"/>
-              <a:t>biến</a:t>
-            </a:r>
-            <a:r>
-              <a:rPr lang="en-US" sz="1800"/>
-              <a:t>. </a:t>
             </a:r>
             <a:endParaRPr lang="en-US" sz="1800" dirty="0"/>
           </a:p>

</xml_diff>